<commit_message>
Removed space from presentation
</commit_message>
<xml_diff>
--- a/presentation/A Programmatic Introduction to Neo4j.pptx
+++ b/presentation/A Programmatic Introduction to Neo4j.pptx
@@ -2384,7 +2384,19 @@
           <a:p>
             <a:r>
               <a:rPr lang="en-US" dirty="0" smtClean="0"/>
-              <a:t>Solutions architecture  and big data</a:t>
+              <a:t>Solutions </a:t>
+            </a:r>
+            <a:r>
+              <a:rPr lang="en-US" smtClean="0"/>
+              <a:t>architecture </a:t>
+            </a:r>
+            <a:r>
+              <a:rPr lang="en-US" smtClean="0"/>
+              <a:t>and </a:t>
+            </a:r>
+            <a:r>
+              <a:rPr lang="en-US" dirty="0" smtClean="0"/>
+              <a:t>big data</a:t>
             </a:r>
             <a:endParaRPr lang="en-US" dirty="0"/>
           </a:p>

</xml_diff>

<commit_message>
Updated the roadmap of the tutorial to include indexing
</commit_message>
<xml_diff>
--- a/presentation/A Programmatic Introduction to Neo4j.pptx
+++ b/presentation/A Programmatic Introduction to Neo4j.pptx
@@ -2336,25 +2336,53 @@
         <p:spPr/>
         <p:txBody>
           <a:bodyPr>
-            <a:normAutofit lnSpcReduction="10000"/>
+            <a:normAutofit fontScale="85000" lnSpcReduction="20000"/>
           </a:bodyPr>
           <a:lstStyle/>
           <a:p>
             <a:r>
               <a:rPr lang="en-US" dirty="0" smtClean="0"/>
-              <a:t>An overview of NOSQL and Graph Databases</a:t>
-            </a:r>
-          </a:p>
-          <a:p>
+              <a:t>NOSQL </a:t>
+            </a:r>
+            <a:r>
+              <a:rPr lang="en-US" smtClean="0"/>
+              <a:t>overview </a:t>
+            </a:r>
+          </a:p>
+          <a:p>
+            <a:r>
+              <a:rPr lang="en-US" smtClean="0"/>
+              <a:t>Neo4j </a:t>
+            </a:r>
             <a:r>
               <a:rPr lang="en-US" dirty="0" smtClean="0"/>
-              <a:t>Neo4j fundamentals</a:t>
+              <a:t>fundamentals</a:t>
             </a:r>
           </a:p>
           <a:p>
             <a:r>
               <a:rPr lang="en-US" dirty="0" smtClean="0"/>
-              <a:t>Core API</a:t>
+              <a:t>Core </a:t>
+            </a:r>
+            <a:r>
+              <a:rPr lang="en-US" dirty="0" smtClean="0"/>
+              <a:t>API</a:t>
+            </a:r>
+          </a:p>
+          <a:p>
+            <a:r>
+              <a:rPr lang="en-US" dirty="0"/>
+              <a:t>Indexing</a:t>
+            </a:r>
+          </a:p>
+          <a:p>
+            <a:r>
+              <a:rPr lang="en-US" dirty="0" smtClean="0"/>
+              <a:t>Neo4j </a:t>
+            </a:r>
+            <a:r>
+              <a:rPr lang="en-US" dirty="0"/>
+              <a:t>Shell</a:t>
             </a:r>
           </a:p>
           <a:p>
@@ -2365,7 +2393,7 @@
           </a:p>
           <a:p>
             <a:r>
-              <a:rPr lang="en-US" dirty="0" smtClean="0"/>
+              <a:rPr lang="en-US" dirty="0"/>
               <a:t>Graph algorithms</a:t>
             </a:r>
           </a:p>
@@ -2378,25 +2406,17 @@
           <a:p>
             <a:r>
               <a:rPr lang="en-US" dirty="0" smtClean="0"/>
-              <a:t>REST API</a:t>
-            </a:r>
-          </a:p>
-          <a:p>
+              <a:t>REST </a:t>
+            </a:r>
             <a:r>
               <a:rPr lang="en-US" dirty="0" smtClean="0"/>
-              <a:t>Solutions </a:t>
-            </a:r>
-            <a:r>
-              <a:rPr lang="en-US" smtClean="0"/>
-              <a:t>architecture </a:t>
-            </a:r>
-            <a:r>
-              <a:rPr lang="en-US" smtClean="0"/>
-              <a:t>and </a:t>
-            </a:r>
+              <a:t>API</a:t>
+            </a:r>
+          </a:p>
+          <a:p>
             <a:r>
               <a:rPr lang="en-US" dirty="0" smtClean="0"/>
-              <a:t>big data</a:t>
+              <a:t>Solutions architecture and big data</a:t>
             </a:r>
             <a:endParaRPr lang="en-US" dirty="0"/>
           </a:p>

</xml_diff>

<commit_message>
Reinstated the ivy build after the faulty POMs were sorted out
</commit_message>
<xml_diff>
--- a/presentation/A Programmatic Introduction to Neo4j.pptx
+++ b/presentation/A Programmatic Introduction to Neo4j.pptx
@@ -2336,17 +2336,13 @@
         <p:spPr/>
         <p:txBody>
           <a:bodyPr>
-            <a:normAutofit fontScale="85000" lnSpcReduction="20000"/>
+            <a:normAutofit fontScale="92500" lnSpcReduction="20000"/>
           </a:bodyPr>
           <a:lstStyle/>
           <a:p>
             <a:r>
               <a:rPr lang="en-US" dirty="0" smtClean="0"/>
-              <a:t>NOSQL </a:t>
-            </a:r>
-            <a:r>
-              <a:rPr lang="en-US" smtClean="0"/>
-              <a:t>overview </a:t>
+              <a:t>NOSQL overview </a:t>
             </a:r>
           </a:p>
           <a:p>
@@ -2355,9 +2351,10 @@
               <a:t>Neo4j </a:t>
             </a:r>
             <a:r>
-              <a:rPr lang="en-US" dirty="0" smtClean="0"/>
-              <a:t>fundamentals</a:t>
-            </a:r>
+              <a:rPr lang="en-US" smtClean="0"/>
+              <a:t>fundamentals (and tools)</a:t>
+            </a:r>
+            <a:endParaRPr lang="en-US" dirty="0" smtClean="0"/>
           </a:p>
           <a:p>
             <a:r>
@@ -2395,12 +2392,6 @@
             <a:r>
               <a:rPr lang="en-US" dirty="0"/>
               <a:t>Graph algorithms</a:t>
-            </a:r>
-          </a:p>
-          <a:p>
-            <a:r>
-              <a:rPr lang="en-US" dirty="0" smtClean="0"/>
-              <a:t>Gremlin</a:t>
             </a:r>
           </a:p>
           <a:p>

</xml_diff>

<commit_message>
The first bits of a NOSQL drivers slideset
</commit_message>
<xml_diff>
--- a/presentation/A Programmatic Introduction to Neo4j.pptx
+++ b/presentation/A Programmatic Introduction to Neo4j.pptx
@@ -4,10 +4,20 @@
   <p:sldMasterIdLst>
     <p:sldMasterId id="2147483648" r:id="rId1"/>
   </p:sldMasterIdLst>
+  <p:notesMasterIdLst>
+    <p:notesMasterId r:id="rId12"/>
+  </p:notesMasterIdLst>
   <p:sldIdLst>
     <p:sldId id="257" r:id="rId2"/>
     <p:sldId id="259" r:id="rId3"/>
     <p:sldId id="258" r:id="rId4"/>
+    <p:sldId id="260" r:id="rId5"/>
+    <p:sldId id="261" r:id="rId6"/>
+    <p:sldId id="262" r:id="rId7"/>
+    <p:sldId id="263" r:id="rId8"/>
+    <p:sldId id="264" r:id="rId9"/>
+    <p:sldId id="265" r:id="rId10"/>
+    <p:sldId id="266" r:id="rId11"/>
   </p:sldIdLst>
   <p:sldSz cx="9144000" cy="6858000" type="screen4x3"/>
   <p:notesSz cx="6858000" cy="9144000"/>
@@ -107,6 +117,844 @@
     </a:lvl9pPr>
   </p:defaultTextStyle>
 </p:presentation>
+</file>
+
+<file path=ppt/notesMasters/notesMaster1.xml><?xml version="1.0" encoding="utf-8"?>
+<p:notesMaster xmlns:a="http://schemas.openxmlformats.org/drawingml/2006/main" xmlns:r="http://schemas.openxmlformats.org/officeDocument/2006/relationships" xmlns:p="http://schemas.openxmlformats.org/presentationml/2006/main">
+  <p:cSld>
+    <p:bg>
+      <p:bgRef idx="1001">
+        <a:schemeClr val="bg1"/>
+      </p:bgRef>
+    </p:bg>
+    <p:spTree>
+      <p:nvGrpSpPr>
+        <p:cNvPr id="1" name=""/>
+        <p:cNvGrpSpPr/>
+        <p:nvPr/>
+      </p:nvGrpSpPr>
+      <p:grpSpPr>
+        <a:xfrm>
+          <a:off x="0" y="0"/>
+          <a:ext cx="0" cy="0"/>
+          <a:chOff x="0" y="0"/>
+          <a:chExt cx="0" cy="0"/>
+        </a:xfrm>
+      </p:grpSpPr>
+      <p:sp>
+        <p:nvSpPr>
+          <p:cNvPr id="2" name="Header Placeholder 1"/>
+          <p:cNvSpPr>
+            <a:spLocks noGrp="1"/>
+          </p:cNvSpPr>
+          <p:nvPr>
+            <p:ph type="hdr" sz="quarter"/>
+          </p:nvPr>
+        </p:nvSpPr>
+        <p:spPr>
+          <a:xfrm>
+            <a:off x="0" y="0"/>
+            <a:ext cx="2971800" cy="457200"/>
+          </a:xfrm>
+          <a:prstGeom prst="rect">
+            <a:avLst/>
+          </a:prstGeom>
+        </p:spPr>
+        <p:txBody>
+          <a:bodyPr vert="horz" lIns="91440" tIns="45720" rIns="91440" bIns="45720" rtlCol="0"/>
+          <a:lstStyle>
+            <a:lvl1pPr algn="l">
+              <a:defRPr sz="1200"/>
+            </a:lvl1pPr>
+          </a:lstStyle>
+          <a:p>
+            <a:endParaRPr lang="en-US"/>
+          </a:p>
+        </p:txBody>
+      </p:sp>
+      <p:sp>
+        <p:nvSpPr>
+          <p:cNvPr id="3" name="Date Placeholder 2"/>
+          <p:cNvSpPr>
+            <a:spLocks noGrp="1"/>
+          </p:cNvSpPr>
+          <p:nvPr>
+            <p:ph type="dt" idx="1"/>
+          </p:nvPr>
+        </p:nvSpPr>
+        <p:spPr>
+          <a:xfrm>
+            <a:off x="3884613" y="0"/>
+            <a:ext cx="2971800" cy="457200"/>
+          </a:xfrm>
+          <a:prstGeom prst="rect">
+            <a:avLst/>
+          </a:prstGeom>
+        </p:spPr>
+        <p:txBody>
+          <a:bodyPr vert="horz" lIns="91440" tIns="45720" rIns="91440" bIns="45720" rtlCol="0"/>
+          <a:lstStyle>
+            <a:lvl1pPr algn="r">
+              <a:defRPr sz="1200"/>
+            </a:lvl1pPr>
+          </a:lstStyle>
+          <a:p>
+            <a:fld id="{C8E3EF39-9CB9-4F4F-A6BC-CBBBC77B42E8}" type="datetimeFigureOut">
+              <a:rPr lang="en-US" smtClean="0"/>
+              <a:t>16/03/2011</a:t>
+            </a:fld>
+            <a:endParaRPr lang="en-US"/>
+          </a:p>
+        </p:txBody>
+      </p:sp>
+      <p:sp>
+        <p:nvSpPr>
+          <p:cNvPr id="4" name="Slide Image Placeholder 3"/>
+          <p:cNvSpPr>
+            <a:spLocks noGrp="1" noRot="1" noChangeAspect="1"/>
+          </p:cNvSpPr>
+          <p:nvPr>
+            <p:ph type="sldImg" idx="2"/>
+          </p:nvPr>
+        </p:nvSpPr>
+        <p:spPr>
+          <a:xfrm>
+            <a:off x="1143000" y="685800"/>
+            <a:ext cx="4572000" cy="3429000"/>
+          </a:xfrm>
+          <a:prstGeom prst="rect">
+            <a:avLst/>
+          </a:prstGeom>
+          <a:noFill/>
+          <a:ln w="12700">
+            <a:solidFill>
+              <a:prstClr val="black"/>
+            </a:solidFill>
+          </a:ln>
+        </p:spPr>
+        <p:txBody>
+          <a:bodyPr vert="horz" lIns="91440" tIns="45720" rIns="91440" bIns="45720" rtlCol="0" anchor="ctr"/>
+          <a:lstStyle/>
+          <a:p>
+            <a:endParaRPr lang="en-US"/>
+          </a:p>
+        </p:txBody>
+      </p:sp>
+      <p:sp>
+        <p:nvSpPr>
+          <p:cNvPr id="5" name="Notes Placeholder 4"/>
+          <p:cNvSpPr>
+            <a:spLocks noGrp="1"/>
+          </p:cNvSpPr>
+          <p:nvPr>
+            <p:ph type="body" sz="quarter" idx="3"/>
+          </p:nvPr>
+        </p:nvSpPr>
+        <p:spPr>
+          <a:xfrm>
+            <a:off x="685800" y="4343400"/>
+            <a:ext cx="5486400" cy="4114800"/>
+          </a:xfrm>
+          <a:prstGeom prst="rect">
+            <a:avLst/>
+          </a:prstGeom>
+        </p:spPr>
+        <p:txBody>
+          <a:bodyPr vert="horz" lIns="91440" tIns="45720" rIns="91440" bIns="45720" rtlCol="0"/>
+          <a:lstStyle/>
+          <a:p>
+            <a:pPr lvl="0"/>
+            <a:r>
+              <a:rPr lang="en-GB" smtClean="0"/>
+              <a:t>Click to edit Master text styles</a:t>
+            </a:r>
+          </a:p>
+          <a:p>
+            <a:pPr lvl="1"/>
+            <a:r>
+              <a:rPr lang="en-GB" smtClean="0"/>
+              <a:t>Second level</a:t>
+            </a:r>
+          </a:p>
+          <a:p>
+            <a:pPr lvl="2"/>
+            <a:r>
+              <a:rPr lang="en-GB" smtClean="0"/>
+              <a:t>Third level</a:t>
+            </a:r>
+          </a:p>
+          <a:p>
+            <a:pPr lvl="3"/>
+            <a:r>
+              <a:rPr lang="en-GB" smtClean="0"/>
+              <a:t>Fourth level</a:t>
+            </a:r>
+          </a:p>
+          <a:p>
+            <a:pPr lvl="4"/>
+            <a:r>
+              <a:rPr lang="en-GB" smtClean="0"/>
+              <a:t>Fifth level</a:t>
+            </a:r>
+            <a:endParaRPr lang="en-US"/>
+          </a:p>
+        </p:txBody>
+      </p:sp>
+      <p:sp>
+        <p:nvSpPr>
+          <p:cNvPr id="6" name="Footer Placeholder 5"/>
+          <p:cNvSpPr>
+            <a:spLocks noGrp="1"/>
+          </p:cNvSpPr>
+          <p:nvPr>
+            <p:ph type="ftr" sz="quarter" idx="4"/>
+          </p:nvPr>
+        </p:nvSpPr>
+        <p:spPr>
+          <a:xfrm>
+            <a:off x="0" y="8685213"/>
+            <a:ext cx="2971800" cy="457200"/>
+          </a:xfrm>
+          <a:prstGeom prst="rect">
+            <a:avLst/>
+          </a:prstGeom>
+        </p:spPr>
+        <p:txBody>
+          <a:bodyPr vert="horz" lIns="91440" tIns="45720" rIns="91440" bIns="45720" rtlCol="0" anchor="b"/>
+          <a:lstStyle>
+            <a:lvl1pPr algn="l">
+              <a:defRPr sz="1200"/>
+            </a:lvl1pPr>
+          </a:lstStyle>
+          <a:p>
+            <a:endParaRPr lang="en-US"/>
+          </a:p>
+        </p:txBody>
+      </p:sp>
+      <p:sp>
+        <p:nvSpPr>
+          <p:cNvPr id="7" name="Slide Number Placeholder 6"/>
+          <p:cNvSpPr>
+            <a:spLocks noGrp="1"/>
+          </p:cNvSpPr>
+          <p:nvPr>
+            <p:ph type="sldNum" sz="quarter" idx="5"/>
+          </p:nvPr>
+        </p:nvSpPr>
+        <p:spPr>
+          <a:xfrm>
+            <a:off x="3884613" y="8685213"/>
+            <a:ext cx="2971800" cy="457200"/>
+          </a:xfrm>
+          <a:prstGeom prst="rect">
+            <a:avLst/>
+          </a:prstGeom>
+        </p:spPr>
+        <p:txBody>
+          <a:bodyPr vert="horz" lIns="91440" tIns="45720" rIns="91440" bIns="45720" rtlCol="0" anchor="b"/>
+          <a:lstStyle>
+            <a:lvl1pPr algn="r">
+              <a:defRPr sz="1200"/>
+            </a:lvl1pPr>
+          </a:lstStyle>
+          <a:p>
+            <a:fld id="{CED8D948-D25D-8E4B-9BFE-B537C3A7CF38}" type="slidenum">
+              <a:rPr lang="en-US" smtClean="0"/>
+              <a:t>‹#›</a:t>
+            </a:fld>
+            <a:endParaRPr lang="en-US"/>
+          </a:p>
+        </p:txBody>
+      </p:sp>
+    </p:spTree>
+    <p:extLst>
+      <p:ext uri="{BB962C8B-B14F-4D97-AF65-F5344CB8AC3E}">
+        <p14:creationId xmlns:p14="http://schemas.microsoft.com/office/powerpoint/2010/main" val="948727577"/>
+      </p:ext>
+    </p:extLst>
+  </p:cSld>
+  <p:clrMap bg1="lt1" tx1="dk1" bg2="lt2" tx2="dk2" accent1="accent1" accent2="accent2" accent3="accent3" accent4="accent4" accent5="accent5" accent6="accent6" hlink="hlink" folHlink="folHlink"/>
+  <p:notesStyle>
+    <a:lvl1pPr marL="0" algn="l" defTabSz="457200" rtl="0" eaLnBrk="1" latinLnBrk="0" hangingPunct="1">
+      <a:defRPr sz="1200" kern="1200">
+        <a:solidFill>
+          <a:schemeClr val="tx1"/>
+        </a:solidFill>
+        <a:latin typeface="+mn-lt"/>
+        <a:ea typeface="+mn-ea"/>
+        <a:cs typeface="+mn-cs"/>
+      </a:defRPr>
+    </a:lvl1pPr>
+    <a:lvl2pPr marL="457200" algn="l" defTabSz="457200" rtl="0" eaLnBrk="1" latinLnBrk="0" hangingPunct="1">
+      <a:defRPr sz="1200" kern="1200">
+        <a:solidFill>
+          <a:schemeClr val="tx1"/>
+        </a:solidFill>
+        <a:latin typeface="+mn-lt"/>
+        <a:ea typeface="+mn-ea"/>
+        <a:cs typeface="+mn-cs"/>
+      </a:defRPr>
+    </a:lvl2pPr>
+    <a:lvl3pPr marL="914400" algn="l" defTabSz="457200" rtl="0" eaLnBrk="1" latinLnBrk="0" hangingPunct="1">
+      <a:defRPr sz="1200" kern="1200">
+        <a:solidFill>
+          <a:schemeClr val="tx1"/>
+        </a:solidFill>
+        <a:latin typeface="+mn-lt"/>
+        <a:ea typeface="+mn-ea"/>
+        <a:cs typeface="+mn-cs"/>
+      </a:defRPr>
+    </a:lvl3pPr>
+    <a:lvl4pPr marL="1371600" algn="l" defTabSz="457200" rtl="0" eaLnBrk="1" latinLnBrk="0" hangingPunct="1">
+      <a:defRPr sz="1200" kern="1200">
+        <a:solidFill>
+          <a:schemeClr val="tx1"/>
+        </a:solidFill>
+        <a:latin typeface="+mn-lt"/>
+        <a:ea typeface="+mn-ea"/>
+        <a:cs typeface="+mn-cs"/>
+      </a:defRPr>
+    </a:lvl4pPr>
+    <a:lvl5pPr marL="1828800" algn="l" defTabSz="457200" rtl="0" eaLnBrk="1" latinLnBrk="0" hangingPunct="1">
+      <a:defRPr sz="1200" kern="1200">
+        <a:solidFill>
+          <a:schemeClr val="tx1"/>
+        </a:solidFill>
+        <a:latin typeface="+mn-lt"/>
+        <a:ea typeface="+mn-ea"/>
+        <a:cs typeface="+mn-cs"/>
+      </a:defRPr>
+    </a:lvl5pPr>
+    <a:lvl6pPr marL="2286000" algn="l" defTabSz="457200" rtl="0" eaLnBrk="1" latinLnBrk="0" hangingPunct="1">
+      <a:defRPr sz="1200" kern="1200">
+        <a:solidFill>
+          <a:schemeClr val="tx1"/>
+        </a:solidFill>
+        <a:latin typeface="+mn-lt"/>
+        <a:ea typeface="+mn-ea"/>
+        <a:cs typeface="+mn-cs"/>
+      </a:defRPr>
+    </a:lvl6pPr>
+    <a:lvl7pPr marL="2743200" algn="l" defTabSz="457200" rtl="0" eaLnBrk="1" latinLnBrk="0" hangingPunct="1">
+      <a:defRPr sz="1200" kern="1200">
+        <a:solidFill>
+          <a:schemeClr val="tx1"/>
+        </a:solidFill>
+        <a:latin typeface="+mn-lt"/>
+        <a:ea typeface="+mn-ea"/>
+        <a:cs typeface="+mn-cs"/>
+      </a:defRPr>
+    </a:lvl7pPr>
+    <a:lvl8pPr marL="3200400" algn="l" defTabSz="457200" rtl="0" eaLnBrk="1" latinLnBrk="0" hangingPunct="1">
+      <a:defRPr sz="1200" kern="1200">
+        <a:solidFill>
+          <a:schemeClr val="tx1"/>
+        </a:solidFill>
+        <a:latin typeface="+mn-lt"/>
+        <a:ea typeface="+mn-ea"/>
+        <a:cs typeface="+mn-cs"/>
+      </a:defRPr>
+    </a:lvl8pPr>
+    <a:lvl9pPr marL="3657600" algn="l" defTabSz="457200" rtl="0" eaLnBrk="1" latinLnBrk="0" hangingPunct="1">
+      <a:defRPr sz="1200" kern="1200">
+        <a:solidFill>
+          <a:schemeClr val="tx1"/>
+        </a:solidFill>
+        <a:latin typeface="+mn-lt"/>
+        <a:ea typeface="+mn-ea"/>
+        <a:cs typeface="+mn-cs"/>
+      </a:defRPr>
+    </a:lvl9pPr>
+  </p:notesStyle>
+</p:notesMaster>
+</file>
+
+<file path=ppt/notesSlides/notesSlide1.xml><?xml version="1.0" encoding="utf-8"?>
+<p:notes xmlns:a="http://schemas.openxmlformats.org/drawingml/2006/main" xmlns:r="http://schemas.openxmlformats.org/officeDocument/2006/relationships" xmlns:p="http://schemas.openxmlformats.org/presentationml/2006/main">
+  <p:cSld>
+    <p:spTree>
+      <p:nvGrpSpPr>
+        <p:cNvPr id="1" name=""/>
+        <p:cNvGrpSpPr/>
+        <p:nvPr/>
+      </p:nvGrpSpPr>
+      <p:grpSpPr>
+        <a:xfrm>
+          <a:off x="0" y="0"/>
+          <a:ext cx="0" cy="0"/>
+          <a:chOff x="0" y="0"/>
+          <a:chExt cx="0" cy="0"/>
+        </a:xfrm>
+      </p:grpSpPr>
+      <p:sp>
+        <p:nvSpPr>
+          <p:cNvPr id="2" name="Slide Image Placeholder 1"/>
+          <p:cNvSpPr>
+            <a:spLocks noGrp="1" noRot="1" noChangeAspect="1"/>
+          </p:cNvSpPr>
+          <p:nvPr>
+            <p:ph type="sldImg"/>
+          </p:nvPr>
+        </p:nvSpPr>
+        <p:spPr/>
+      </p:sp>
+      <p:sp>
+        <p:nvSpPr>
+          <p:cNvPr id="3" name="Notes Placeholder 2"/>
+          <p:cNvSpPr>
+            <a:spLocks noGrp="1"/>
+          </p:cNvSpPr>
+          <p:nvPr>
+            <p:ph type="body" idx="1"/>
+          </p:nvPr>
+        </p:nvSpPr>
+        <p:spPr/>
+        <p:txBody>
+          <a:bodyPr/>
+          <a:lstStyle/>
+          <a:p>
+            <a:r>
+              <a:rPr lang="en-US" dirty="0" smtClean="0"/>
+              <a:t>Future</a:t>
+            </a:r>
+            <a:r>
+              <a:rPr lang="en-US" baseline="0" dirty="0" smtClean="0"/>
+              <a:t> stores will be mixed – right shape for the right job</a:t>
+            </a:r>
+          </a:p>
+          <a:p>
+            <a:r>
+              <a:rPr lang="en-US" baseline="0" dirty="0" smtClean="0"/>
+              <a:t>Polyglot persistence</a:t>
+            </a:r>
+          </a:p>
+          <a:p>
+            <a:r>
+              <a:rPr lang="en-US" baseline="0" dirty="0" smtClean="0"/>
+              <a:t>Frameworks (e.g. spring data) embracing this already</a:t>
+            </a:r>
+            <a:endParaRPr lang="en-US" dirty="0"/>
+          </a:p>
+        </p:txBody>
+      </p:sp>
+      <p:sp>
+        <p:nvSpPr>
+          <p:cNvPr id="4" name="Slide Number Placeholder 3"/>
+          <p:cNvSpPr>
+            <a:spLocks noGrp="1"/>
+          </p:cNvSpPr>
+          <p:nvPr>
+            <p:ph type="sldNum" sz="quarter" idx="10"/>
+          </p:nvPr>
+        </p:nvSpPr>
+        <p:spPr/>
+        <p:txBody>
+          <a:bodyPr/>
+          <a:lstStyle/>
+          <a:p>
+            <a:fld id="{CED8D948-D25D-8E4B-9BFE-B537C3A7CF38}" type="slidenum">
+              <a:rPr lang="en-US" smtClean="0"/>
+              <a:t>4</a:t>
+            </a:fld>
+            <a:endParaRPr lang="en-US"/>
+          </a:p>
+        </p:txBody>
+      </p:sp>
+    </p:spTree>
+    <p:extLst>
+      <p:ext uri="{BB962C8B-B14F-4D97-AF65-F5344CB8AC3E}">
+        <p14:creationId xmlns:p14="http://schemas.microsoft.com/office/powerpoint/2010/main" val="3114432741"/>
+      </p:ext>
+    </p:extLst>
+  </p:cSld>
+  <p:clrMapOvr>
+    <a:masterClrMapping/>
+  </p:clrMapOvr>
+</p:notes>
+</file>
+
+<file path=ppt/notesSlides/notesSlide2.xml><?xml version="1.0" encoding="utf-8"?>
+<p:notes xmlns:a="http://schemas.openxmlformats.org/drawingml/2006/main" xmlns:r="http://schemas.openxmlformats.org/officeDocument/2006/relationships" xmlns:p="http://schemas.openxmlformats.org/presentationml/2006/main">
+  <p:cSld>
+    <p:spTree>
+      <p:nvGrpSpPr>
+        <p:cNvPr id="1" name=""/>
+        <p:cNvGrpSpPr/>
+        <p:nvPr/>
+      </p:nvGrpSpPr>
+      <p:grpSpPr>
+        <a:xfrm>
+          <a:off x="0" y="0"/>
+          <a:ext cx="0" cy="0"/>
+          <a:chOff x="0" y="0"/>
+          <a:chExt cx="0" cy="0"/>
+        </a:xfrm>
+      </p:grpSpPr>
+      <p:sp>
+        <p:nvSpPr>
+          <p:cNvPr id="2" name="Slide Image Placeholder 1"/>
+          <p:cNvSpPr>
+            <a:spLocks noGrp="1" noRot="1" noChangeAspect="1"/>
+          </p:cNvSpPr>
+          <p:nvPr>
+            <p:ph type="sldImg"/>
+          </p:nvPr>
+        </p:nvSpPr>
+        <p:spPr/>
+      </p:sp>
+      <p:sp>
+        <p:nvSpPr>
+          <p:cNvPr id="3" name="Notes Placeholder 2"/>
+          <p:cNvSpPr>
+            <a:spLocks noGrp="1"/>
+          </p:cNvSpPr>
+          <p:nvPr>
+            <p:ph type="body" idx="1"/>
+          </p:nvPr>
+        </p:nvSpPr>
+        <p:spPr/>
+        <p:txBody>
+          <a:bodyPr/>
+          <a:lstStyle/>
+          <a:p>
+            <a:endParaRPr lang="en-US" dirty="0"/>
+          </a:p>
+        </p:txBody>
+      </p:sp>
+      <p:sp>
+        <p:nvSpPr>
+          <p:cNvPr id="4" name="Slide Number Placeholder 3"/>
+          <p:cNvSpPr>
+            <a:spLocks noGrp="1"/>
+          </p:cNvSpPr>
+          <p:nvPr>
+            <p:ph type="sldNum" sz="quarter" idx="10"/>
+          </p:nvPr>
+        </p:nvSpPr>
+        <p:spPr/>
+        <p:txBody>
+          <a:bodyPr/>
+          <a:lstStyle/>
+          <a:p>
+            <a:fld id="{CED8D948-D25D-8E4B-9BFE-B537C3A7CF38}" type="slidenum">
+              <a:rPr lang="en-US" smtClean="0"/>
+              <a:t>6</a:t>
+            </a:fld>
+            <a:endParaRPr lang="en-US"/>
+          </a:p>
+        </p:txBody>
+      </p:sp>
+    </p:spTree>
+    <p:extLst>
+      <p:ext uri="{BB962C8B-B14F-4D97-AF65-F5344CB8AC3E}">
+        <p14:creationId xmlns:p14="http://schemas.microsoft.com/office/powerpoint/2010/main" val="850844881"/>
+      </p:ext>
+    </p:extLst>
+  </p:cSld>
+  <p:clrMapOvr>
+    <a:masterClrMapping/>
+  </p:clrMapOvr>
+</p:notes>
+</file>
+
+<file path=ppt/notesSlides/notesSlide3.xml><?xml version="1.0" encoding="utf-8"?>
+<p:notes xmlns:a="http://schemas.openxmlformats.org/drawingml/2006/main" xmlns:r="http://schemas.openxmlformats.org/officeDocument/2006/relationships" xmlns:p="http://schemas.openxmlformats.org/presentationml/2006/main">
+  <p:cSld>
+    <p:spTree>
+      <p:nvGrpSpPr>
+        <p:cNvPr id="1" name=""/>
+        <p:cNvGrpSpPr/>
+        <p:nvPr/>
+      </p:nvGrpSpPr>
+      <p:grpSpPr>
+        <a:xfrm>
+          <a:off x="0" y="0"/>
+          <a:ext cx="0" cy="0"/>
+          <a:chOff x="0" y="0"/>
+          <a:chExt cx="0" cy="0"/>
+        </a:xfrm>
+      </p:grpSpPr>
+      <p:sp>
+        <p:nvSpPr>
+          <p:cNvPr id="2" name="Slide Image Placeholder 1"/>
+          <p:cNvSpPr>
+            <a:spLocks noGrp="1" noRot="1" noChangeAspect="1"/>
+          </p:cNvSpPr>
+          <p:nvPr>
+            <p:ph type="sldImg"/>
+          </p:nvPr>
+        </p:nvSpPr>
+        <p:spPr/>
+      </p:sp>
+      <p:sp>
+        <p:nvSpPr>
+          <p:cNvPr id="3" name="Notes Placeholder 2"/>
+          <p:cNvSpPr>
+            <a:spLocks noGrp="1"/>
+          </p:cNvSpPr>
+          <p:nvPr>
+            <p:ph type="body" idx="1"/>
+          </p:nvPr>
+        </p:nvSpPr>
+        <p:spPr/>
+        <p:txBody>
+          <a:bodyPr/>
+          <a:lstStyle/>
+          <a:p>
+            <a:r>
+              <a:rPr lang="en-US" dirty="0" smtClean="0"/>
+              <a:t>UGC = User Generated Content</a:t>
+            </a:r>
+          </a:p>
+          <a:p>
+            <a:r>
+              <a:rPr lang="en-US" dirty="0" smtClean="0"/>
+              <a:t>GGG = Giant Global Graph (what</a:t>
+            </a:r>
+            <a:r>
+              <a:rPr lang="en-US" baseline="0" dirty="0" smtClean="0"/>
+              <a:t> the web will become)</a:t>
+            </a:r>
+            <a:endParaRPr lang="en-US" dirty="0"/>
+          </a:p>
+        </p:txBody>
+      </p:sp>
+      <p:sp>
+        <p:nvSpPr>
+          <p:cNvPr id="4" name="Slide Number Placeholder 3"/>
+          <p:cNvSpPr>
+            <a:spLocks noGrp="1"/>
+          </p:cNvSpPr>
+          <p:nvPr>
+            <p:ph type="sldNum" sz="quarter" idx="10"/>
+          </p:nvPr>
+        </p:nvSpPr>
+        <p:spPr/>
+        <p:txBody>
+          <a:bodyPr/>
+          <a:lstStyle/>
+          <a:p>
+            <a:fld id="{CED8D948-D25D-8E4B-9BFE-B537C3A7CF38}" type="slidenum">
+              <a:rPr lang="en-US" smtClean="0"/>
+              <a:t>7</a:t>
+            </a:fld>
+            <a:endParaRPr lang="en-US"/>
+          </a:p>
+        </p:txBody>
+      </p:sp>
+    </p:spTree>
+    <p:extLst>
+      <p:ext uri="{BB962C8B-B14F-4D97-AF65-F5344CB8AC3E}">
+        <p14:creationId xmlns:p14="http://schemas.microsoft.com/office/powerpoint/2010/main" val="1087219945"/>
+      </p:ext>
+    </p:extLst>
+  </p:cSld>
+  <p:clrMapOvr>
+    <a:masterClrMapping/>
+  </p:clrMapOvr>
+</p:notes>
+</file>
+
+<file path=ppt/notesSlides/notesSlide4.xml><?xml version="1.0" encoding="utf-8"?>
+<p:notes xmlns:a="http://schemas.openxmlformats.org/drawingml/2006/main" xmlns:r="http://schemas.openxmlformats.org/officeDocument/2006/relationships" xmlns:p="http://schemas.openxmlformats.org/presentationml/2006/main">
+  <p:cSld>
+    <p:spTree>
+      <p:nvGrpSpPr>
+        <p:cNvPr id="1" name=""/>
+        <p:cNvGrpSpPr/>
+        <p:nvPr/>
+      </p:nvGrpSpPr>
+      <p:grpSpPr>
+        <a:xfrm>
+          <a:off x="0" y="0"/>
+          <a:ext cx="0" cy="0"/>
+          <a:chOff x="0" y="0"/>
+          <a:chExt cx="0" cy="0"/>
+        </a:xfrm>
+      </p:grpSpPr>
+      <p:sp>
+        <p:nvSpPr>
+          <p:cNvPr id="2" name="Slide Image Placeholder 1"/>
+          <p:cNvSpPr>
+            <a:spLocks noGrp="1" noRot="1" noChangeAspect="1"/>
+          </p:cNvSpPr>
+          <p:nvPr>
+            <p:ph type="sldImg"/>
+          </p:nvPr>
+        </p:nvSpPr>
+        <p:spPr/>
+      </p:sp>
+      <p:sp>
+        <p:nvSpPr>
+          <p:cNvPr id="3" name="Notes Placeholder 2"/>
+          <p:cNvSpPr>
+            <a:spLocks noGrp="1"/>
+          </p:cNvSpPr>
+          <p:nvPr>
+            <p:ph type="body" idx="1"/>
+          </p:nvPr>
+        </p:nvSpPr>
+        <p:spPr/>
+        <p:txBody>
+          <a:bodyPr/>
+          <a:lstStyle/>
+          <a:p>
+            <a:r>
+              <a:rPr lang="en-US" dirty="0" smtClean="0"/>
+              <a:t>This is strictly</a:t>
+            </a:r>
+            <a:r>
+              <a:rPr lang="en-US" baseline="0" dirty="0" smtClean="0"/>
+              <a:t> about connected data – joins kill performance there.</a:t>
+            </a:r>
+          </a:p>
+          <a:p>
+            <a:endParaRPr lang="en-US" baseline="0" dirty="0" smtClean="0"/>
+          </a:p>
+          <a:p>
+            <a:r>
+              <a:rPr lang="en-US" baseline="0" dirty="0" smtClean="0"/>
+              <a:t>No bashing of RDBMS performance for tabular transaction processing</a:t>
+            </a:r>
+            <a:endParaRPr lang="en-US" dirty="0"/>
+          </a:p>
+        </p:txBody>
+      </p:sp>
+      <p:sp>
+        <p:nvSpPr>
+          <p:cNvPr id="4" name="Slide Number Placeholder 3"/>
+          <p:cNvSpPr>
+            <a:spLocks noGrp="1"/>
+          </p:cNvSpPr>
+          <p:nvPr>
+            <p:ph type="sldNum" sz="quarter" idx="10"/>
+          </p:nvPr>
+        </p:nvSpPr>
+        <p:spPr/>
+        <p:txBody>
+          <a:bodyPr/>
+          <a:lstStyle/>
+          <a:p>
+            <a:fld id="{CED8D948-D25D-8E4B-9BFE-B537C3A7CF38}" type="slidenum">
+              <a:rPr lang="en-US" smtClean="0"/>
+              <a:t>9</a:t>
+            </a:fld>
+            <a:endParaRPr lang="en-US"/>
+          </a:p>
+        </p:txBody>
+      </p:sp>
+    </p:spTree>
+    <p:extLst>
+      <p:ext uri="{BB962C8B-B14F-4D97-AF65-F5344CB8AC3E}">
+        <p14:creationId xmlns:p14="http://schemas.microsoft.com/office/powerpoint/2010/main" val="4087850859"/>
+      </p:ext>
+    </p:extLst>
+  </p:cSld>
+  <p:clrMapOvr>
+    <a:masterClrMapping/>
+  </p:clrMapOvr>
+</p:notes>
+</file>
+
+<file path=ppt/notesSlides/notesSlide5.xml><?xml version="1.0" encoding="utf-8"?>
+<p:notes xmlns:a="http://schemas.openxmlformats.org/drawingml/2006/main" xmlns:r="http://schemas.openxmlformats.org/officeDocument/2006/relationships" xmlns:p="http://schemas.openxmlformats.org/presentationml/2006/main">
+  <p:cSld>
+    <p:spTree>
+      <p:nvGrpSpPr>
+        <p:cNvPr id="1" name=""/>
+        <p:cNvGrpSpPr/>
+        <p:nvPr/>
+      </p:nvGrpSpPr>
+      <p:grpSpPr>
+        <a:xfrm>
+          <a:off x="0" y="0"/>
+          <a:ext cx="0" cy="0"/>
+          <a:chOff x="0" y="0"/>
+          <a:chExt cx="0" cy="0"/>
+        </a:xfrm>
+      </p:grpSpPr>
+      <p:sp>
+        <p:nvSpPr>
+          <p:cNvPr id="2" name="Slide Image Placeholder 1"/>
+          <p:cNvSpPr>
+            <a:spLocks noGrp="1" noRot="1" noChangeAspect="1"/>
+          </p:cNvSpPr>
+          <p:nvPr>
+            <p:ph type="sldImg"/>
+          </p:nvPr>
+        </p:nvSpPr>
+        <p:spPr/>
+      </p:sp>
+      <p:sp>
+        <p:nvSpPr>
+          <p:cNvPr id="3" name="Notes Placeholder 2"/>
+          <p:cNvSpPr>
+            <a:spLocks noGrp="1"/>
+          </p:cNvSpPr>
+          <p:nvPr>
+            <p:ph type="body" idx="1"/>
+          </p:nvPr>
+        </p:nvSpPr>
+        <p:spPr/>
+        <p:txBody>
+          <a:bodyPr/>
+          <a:lstStyle/>
+          <a:p>
+            <a:r>
+              <a:rPr lang="en-US" dirty="0" smtClean="0"/>
+              <a:t>This is strictly</a:t>
+            </a:r>
+            <a:r>
+              <a:rPr lang="en-US" baseline="0" dirty="0" smtClean="0"/>
+              <a:t> about connected data – joins kill performance there.</a:t>
+            </a:r>
+          </a:p>
+          <a:p>
+            <a:endParaRPr lang="en-US" baseline="0" dirty="0" smtClean="0"/>
+          </a:p>
+          <a:p>
+            <a:r>
+              <a:rPr lang="en-US" baseline="0" dirty="0" smtClean="0"/>
+              <a:t>No bashing of RDBMS performance for tabular transaction processing</a:t>
+            </a:r>
+            <a:endParaRPr lang="en-US" dirty="0"/>
+          </a:p>
+        </p:txBody>
+      </p:sp>
+      <p:sp>
+        <p:nvSpPr>
+          <p:cNvPr id="4" name="Slide Number Placeholder 3"/>
+          <p:cNvSpPr>
+            <a:spLocks noGrp="1"/>
+          </p:cNvSpPr>
+          <p:nvPr>
+            <p:ph type="sldNum" sz="quarter" idx="10"/>
+          </p:nvPr>
+        </p:nvSpPr>
+        <p:spPr/>
+        <p:txBody>
+          <a:bodyPr/>
+          <a:lstStyle/>
+          <a:p>
+            <a:fld id="{CED8D948-D25D-8E4B-9BFE-B537C3A7CF38}" type="slidenum">
+              <a:rPr lang="en-US" smtClean="0"/>
+              <a:t>10</a:t>
+            </a:fld>
+            <a:endParaRPr lang="en-US"/>
+          </a:p>
+        </p:txBody>
+      </p:sp>
+    </p:spTree>
+    <p:extLst>
+      <p:ext uri="{BB962C8B-B14F-4D97-AF65-F5344CB8AC3E}">
+        <p14:creationId xmlns:p14="http://schemas.microsoft.com/office/powerpoint/2010/main" val="4087850859"/>
+      </p:ext>
+    </p:extLst>
+  </p:cSld>
+  <p:clrMapOvr>
+    <a:masterClrMapping/>
+  </p:clrMapOvr>
+</p:notes>
 </file>
 
 <file path=ppt/slideLayouts/slideLayout1.xml><?xml version="1.0" encoding="utf-8"?>
@@ -2186,6 +3034,344 @@
 </p:sld>
 </file>
 
+<file path=ppt/slides/slide10.xml><?xml version="1.0" encoding="utf-8"?>
+<p:sld xmlns:a="http://schemas.openxmlformats.org/drawingml/2006/main" xmlns:r="http://schemas.openxmlformats.org/officeDocument/2006/relationships" xmlns:p="http://schemas.openxmlformats.org/presentationml/2006/main">
+  <p:cSld>
+    <p:spTree>
+      <p:nvGrpSpPr>
+        <p:cNvPr id="1" name=""/>
+        <p:cNvGrpSpPr/>
+        <p:nvPr/>
+      </p:nvGrpSpPr>
+      <p:grpSpPr>
+        <a:xfrm>
+          <a:off x="0" y="0"/>
+          <a:ext cx="0" cy="0"/>
+          <a:chOff x="0" y="0"/>
+          <a:chExt cx="0" cy="0"/>
+        </a:xfrm>
+      </p:grpSpPr>
+      <p:sp>
+        <p:nvSpPr>
+          <p:cNvPr id="4" name="Title 3"/>
+          <p:cNvSpPr>
+            <a:spLocks noGrp="1"/>
+          </p:cNvSpPr>
+          <p:nvPr>
+            <p:ph type="title"/>
+          </p:nvPr>
+        </p:nvSpPr>
+        <p:spPr/>
+        <p:txBody>
+          <a:bodyPr/>
+          <a:lstStyle/>
+          <a:p>
+            <a:r>
+              <a:rPr lang="en-US" dirty="0" smtClean="0"/>
+              <a:t>Side note: RDBMS performance</a:t>
+            </a:r>
+            <a:endParaRPr lang="en-US" dirty="0"/>
+          </a:p>
+        </p:txBody>
+      </p:sp>
+      <p:pic>
+        <p:nvPicPr>
+          <p:cNvPr id="8" name="Picture 7"/>
+          <p:cNvPicPr>
+            <a:picLocks noChangeAspect="1"/>
+          </p:cNvPicPr>
+          <p:nvPr/>
+        </p:nvPicPr>
+        <p:blipFill>
+          <a:blip r:embed="rId3"/>
+          <a:stretch>
+            <a:fillRect/>
+          </a:stretch>
+        </p:blipFill>
+        <p:spPr>
+          <a:xfrm>
+            <a:off x="103899" y="1417638"/>
+            <a:ext cx="7585364" cy="4927396"/>
+          </a:xfrm>
+          <a:prstGeom prst="rect">
+            <a:avLst/>
+          </a:prstGeom>
+        </p:spPr>
+      </p:pic>
+      <p:pic>
+        <p:nvPicPr>
+          <p:cNvPr id="2" name="Picture 1"/>
+          <p:cNvPicPr>
+            <a:picLocks noChangeAspect="1"/>
+          </p:cNvPicPr>
+          <p:nvPr/>
+        </p:nvPicPr>
+        <p:blipFill>
+          <a:blip r:embed="rId4"/>
+          <a:stretch>
+            <a:fillRect/>
+          </a:stretch>
+        </p:blipFill>
+        <p:spPr>
+          <a:xfrm>
+            <a:off x="668480" y="1817254"/>
+            <a:ext cx="3603337" cy="4051513"/>
+          </a:xfrm>
+          <a:prstGeom prst="rect">
+            <a:avLst/>
+          </a:prstGeom>
+        </p:spPr>
+      </p:pic>
+      <p:pic>
+        <p:nvPicPr>
+          <p:cNvPr id="5" name="Picture 4"/>
+          <p:cNvPicPr>
+            <a:picLocks noChangeAspect="1"/>
+          </p:cNvPicPr>
+          <p:nvPr/>
+        </p:nvPicPr>
+        <p:blipFill>
+          <a:blip r:embed="rId5"/>
+          <a:stretch>
+            <a:fillRect/>
+          </a:stretch>
+        </p:blipFill>
+        <p:spPr>
+          <a:xfrm>
+            <a:off x="1134917" y="1544028"/>
+            <a:ext cx="1093355" cy="1759233"/>
+          </a:xfrm>
+          <a:prstGeom prst="rect">
+            <a:avLst/>
+          </a:prstGeom>
+        </p:spPr>
+      </p:pic>
+      <p:pic>
+        <p:nvPicPr>
+          <p:cNvPr id="6" name="Picture 5"/>
+          <p:cNvPicPr>
+            <a:picLocks noChangeAspect="1"/>
+          </p:cNvPicPr>
+          <p:nvPr/>
+        </p:nvPicPr>
+        <p:blipFill>
+          <a:blip r:embed="rId6"/>
+          <a:stretch>
+            <a:fillRect/>
+          </a:stretch>
+        </p:blipFill>
+        <p:spPr>
+          <a:xfrm>
+            <a:off x="2506801" y="2563092"/>
+            <a:ext cx="1509883" cy="804718"/>
+          </a:xfrm>
+          <a:prstGeom prst="rect">
+            <a:avLst/>
+          </a:prstGeom>
+        </p:spPr>
+      </p:pic>
+      <p:pic>
+        <p:nvPicPr>
+          <p:cNvPr id="9" name="Picture 8"/>
+          <p:cNvPicPr>
+            <a:picLocks noChangeAspect="1"/>
+          </p:cNvPicPr>
+          <p:nvPr/>
+        </p:nvPicPr>
+        <p:blipFill>
+          <a:blip r:embed="rId7"/>
+          <a:stretch>
+            <a:fillRect/>
+          </a:stretch>
+        </p:blipFill>
+        <p:spPr>
+          <a:xfrm>
+            <a:off x="4468091" y="3683558"/>
+            <a:ext cx="2901372" cy="1036801"/>
+          </a:xfrm>
+          <a:prstGeom prst="rect">
+            <a:avLst/>
+          </a:prstGeom>
+        </p:spPr>
+      </p:pic>
+    </p:spTree>
+    <p:extLst>
+      <p:ext uri="{BB962C8B-B14F-4D97-AF65-F5344CB8AC3E}">
+        <p14:creationId xmlns:p14="http://schemas.microsoft.com/office/powerpoint/2010/main" val="3288387370"/>
+      </p:ext>
+    </p:extLst>
+  </p:cSld>
+  <p:clrMapOvr>
+    <a:masterClrMapping/>
+  </p:clrMapOvr>
+  <p:timing>
+    <p:tnLst>
+      <p:par>
+        <p:cTn xmlns:p14="http://schemas.microsoft.com/office/powerpoint/2010/main" id="1" dur="indefinite" restart="never" nodeType="tmRoot">
+          <p:childTnLst>
+            <p:seq concurrent="1" nextAc="seek">
+              <p:cTn id="2" dur="indefinite" nodeType="mainSeq">
+                <p:childTnLst>
+                  <p:par>
+                    <p:cTn id="3" fill="hold">
+                      <p:stCondLst>
+                        <p:cond delay="indefinite"/>
+                      </p:stCondLst>
+                      <p:childTnLst>
+                        <p:par>
+                          <p:cTn id="4" fill="hold">
+                            <p:stCondLst>
+                              <p:cond delay="0"/>
+                            </p:stCondLst>
+                            <p:childTnLst>
+                              <p:par>
+                                <p:cTn id="5" presetID="1" presetClass="entr" presetSubtype="0" fill="hold" nodeType="clickEffect">
+                                  <p:stCondLst>
+                                    <p:cond delay="0"/>
+                                  </p:stCondLst>
+                                  <p:childTnLst>
+                                    <p:set>
+                                      <p:cBhvr>
+                                        <p:cTn id="6" dur="1" fill="hold">
+                                          <p:stCondLst>
+                                            <p:cond delay="0"/>
+                                          </p:stCondLst>
+                                        </p:cTn>
+                                        <p:tgtEl>
+                                          <p:spTgt spid="5"/>
+                                        </p:tgtEl>
+                                        <p:attrNameLst>
+                                          <p:attrName>style.visibility</p:attrName>
+                                        </p:attrNameLst>
+                                      </p:cBhvr>
+                                      <p:to>
+                                        <p:strVal val="visible"/>
+                                      </p:to>
+                                    </p:set>
+                                  </p:childTnLst>
+                                </p:cTn>
+                              </p:par>
+                            </p:childTnLst>
+                          </p:cTn>
+                        </p:par>
+                      </p:childTnLst>
+                    </p:cTn>
+                  </p:par>
+                  <p:par>
+                    <p:cTn id="7" fill="hold">
+                      <p:stCondLst>
+                        <p:cond delay="indefinite"/>
+                      </p:stCondLst>
+                      <p:childTnLst>
+                        <p:par>
+                          <p:cTn id="8" fill="hold">
+                            <p:stCondLst>
+                              <p:cond delay="0"/>
+                            </p:stCondLst>
+                            <p:childTnLst>
+                              <p:par>
+                                <p:cTn id="9" presetID="1" presetClass="entr" presetSubtype="0" fill="hold" nodeType="clickEffect">
+                                  <p:stCondLst>
+                                    <p:cond delay="0"/>
+                                  </p:stCondLst>
+                                  <p:childTnLst>
+                                    <p:set>
+                                      <p:cBhvr>
+                                        <p:cTn id="10" dur="1" fill="hold">
+                                          <p:stCondLst>
+                                            <p:cond delay="0"/>
+                                          </p:stCondLst>
+                                        </p:cTn>
+                                        <p:tgtEl>
+                                          <p:spTgt spid="6"/>
+                                        </p:tgtEl>
+                                        <p:attrNameLst>
+                                          <p:attrName>style.visibility</p:attrName>
+                                        </p:attrNameLst>
+                                      </p:cBhvr>
+                                      <p:to>
+                                        <p:strVal val="visible"/>
+                                      </p:to>
+                                    </p:set>
+                                  </p:childTnLst>
+                                </p:cTn>
+                              </p:par>
+                            </p:childTnLst>
+                          </p:cTn>
+                        </p:par>
+                      </p:childTnLst>
+                    </p:cTn>
+                  </p:par>
+                  <p:par>
+                    <p:cTn id="11" fill="hold">
+                      <p:stCondLst>
+                        <p:cond delay="indefinite"/>
+                      </p:stCondLst>
+                      <p:childTnLst>
+                        <p:par>
+                          <p:cTn id="12" fill="hold">
+                            <p:stCondLst>
+                              <p:cond delay="0"/>
+                            </p:stCondLst>
+                            <p:childTnLst>
+                              <p:par>
+                                <p:cTn id="13" presetID="1" presetClass="entr" presetSubtype="0" fill="hold" nodeType="clickEffect">
+                                  <p:stCondLst>
+                                    <p:cond delay="0"/>
+                                  </p:stCondLst>
+                                  <p:childTnLst>
+                                    <p:set>
+                                      <p:cBhvr>
+                                        <p:cTn id="14" dur="1" fill="hold">
+                                          <p:stCondLst>
+                                            <p:cond delay="0"/>
+                                          </p:stCondLst>
+                                        </p:cTn>
+                                        <p:tgtEl>
+                                          <p:spTgt spid="9"/>
+                                        </p:tgtEl>
+                                        <p:attrNameLst>
+                                          <p:attrName>style.visibility</p:attrName>
+                                        </p:attrNameLst>
+                                      </p:cBhvr>
+                                      <p:to>
+                                        <p:strVal val="visible"/>
+                                      </p:to>
+                                    </p:set>
+                                  </p:childTnLst>
+                                </p:cTn>
+                              </p:par>
+                            </p:childTnLst>
+                          </p:cTn>
+                        </p:par>
+                      </p:childTnLst>
+                    </p:cTn>
+                  </p:par>
+                </p:childTnLst>
+              </p:cTn>
+              <p:prevCondLst>
+                <p:cond evt="onPrev" delay="0">
+                  <p:tgtEl>
+                    <p:sldTgt/>
+                  </p:tgtEl>
+                </p:cond>
+              </p:prevCondLst>
+              <p:nextCondLst>
+                <p:cond evt="onNext" delay="0">
+                  <p:tgtEl>
+                    <p:sldTgt/>
+                  </p:tgtEl>
+                </p:cond>
+              </p:nextCondLst>
+            </p:seq>
+          </p:childTnLst>
+        </p:cTn>
+      </p:par>
+    </p:tnLst>
+  </p:timing>
+</p:sld>
+</file>
+
 <file path=ppt/slides/slide2.xml><?xml version="1.0" encoding="utf-8"?>
 <p:sld xmlns:a="http://schemas.openxmlformats.org/drawingml/2006/main" xmlns:r="http://schemas.openxmlformats.org/officeDocument/2006/relationships" xmlns:p="http://schemas.openxmlformats.org/presentationml/2006/main">
   <p:cSld>
@@ -2348,22 +3534,14 @@
           <a:p>
             <a:r>
               <a:rPr lang="en-US" smtClean="0"/>
-              <a:t>Neo4j </a:t>
-            </a:r>
-            <a:r>
-              <a:rPr lang="en-US" smtClean="0"/>
-              <a:t>fundamentals (and tools)</a:t>
+              <a:t>Neo4j fundamentals (and tools)</a:t>
             </a:r>
             <a:endParaRPr lang="en-US" dirty="0" smtClean="0"/>
           </a:p>
           <a:p>
             <a:r>
               <a:rPr lang="en-US" dirty="0" smtClean="0"/>
-              <a:t>Core </a:t>
-            </a:r>
-            <a:r>
-              <a:rPr lang="en-US" dirty="0" smtClean="0"/>
-              <a:t>API</a:t>
+              <a:t>Core API</a:t>
             </a:r>
           </a:p>
           <a:p>
@@ -2397,11 +3575,7 @@
           <a:p>
             <a:r>
               <a:rPr lang="en-US" dirty="0" smtClean="0"/>
-              <a:t>REST </a:t>
-            </a:r>
-            <a:r>
-              <a:rPr lang="en-US" dirty="0" smtClean="0"/>
-              <a:t>API</a:t>
+              <a:t>REST API</a:t>
             </a:r>
           </a:p>
           <a:p>
@@ -2423,6 +3597,1736 @@
   <p:clrMapOvr>
     <a:masterClrMapping/>
   </p:clrMapOvr>
+</p:sld>
+</file>
+
+<file path=ppt/slides/slide4.xml><?xml version="1.0" encoding="utf-8"?>
+<p:sld xmlns:a="http://schemas.openxmlformats.org/drawingml/2006/main" xmlns:r="http://schemas.openxmlformats.org/officeDocument/2006/relationships" xmlns:p="http://schemas.openxmlformats.org/presentationml/2006/main">
+  <p:cSld>
+    <p:spTree>
+      <p:nvGrpSpPr>
+        <p:cNvPr id="1" name=""/>
+        <p:cNvGrpSpPr/>
+        <p:nvPr/>
+      </p:nvGrpSpPr>
+      <p:grpSpPr>
+        <a:xfrm>
+          <a:off x="0" y="0"/>
+          <a:ext cx="0" cy="0"/>
+          <a:chOff x="0" y="0"/>
+          <a:chExt cx="0" cy="0"/>
+        </a:xfrm>
+      </p:grpSpPr>
+      <p:sp>
+        <p:nvSpPr>
+          <p:cNvPr id="4" name="Title 3"/>
+          <p:cNvSpPr>
+            <a:spLocks noGrp="1"/>
+          </p:cNvSpPr>
+          <p:nvPr>
+            <p:ph type="ctrTitle"/>
+          </p:nvPr>
+        </p:nvSpPr>
+        <p:spPr>
+          <a:xfrm>
+            <a:off x="529955" y="2130425"/>
+            <a:ext cx="8250843" cy="1470025"/>
+          </a:xfrm>
+        </p:spPr>
+        <p:txBody>
+          <a:bodyPr>
+            <a:noAutofit/>
+          </a:bodyPr>
+          <a:lstStyle/>
+          <a:p>
+            <a:r>
+              <a:rPr lang="en-US" sz="11500" b="1" dirty="0" smtClean="0"/>
+              <a:t>N</a:t>
+            </a:r>
+            <a:r>
+              <a:rPr lang="en-US" sz="11500" dirty="0" smtClean="0"/>
+              <a:t>ot </a:t>
+            </a:r>
+            <a:r>
+              <a:rPr lang="en-US" sz="11500" b="1" u="sng" dirty="0" smtClean="0"/>
+              <a:t>O</a:t>
+            </a:r>
+            <a:r>
+              <a:rPr lang="en-US" sz="11500" u="sng" dirty="0" smtClean="0"/>
+              <a:t>nly</a:t>
+            </a:r>
+            <a:r>
+              <a:rPr lang="en-US" sz="11500" dirty="0" smtClean="0"/>
+              <a:t> </a:t>
+            </a:r>
+            <a:r>
+              <a:rPr lang="en-US" sz="11500" b="1" dirty="0" smtClean="0"/>
+              <a:t>S</a:t>
+            </a:r>
+            <a:r>
+              <a:rPr lang="en-US" sz="11500" dirty="0" smtClean="0"/>
+              <a:t>QL</a:t>
+            </a:r>
+            <a:endParaRPr lang="en-US" sz="11500" dirty="0"/>
+          </a:p>
+        </p:txBody>
+      </p:sp>
+      <p:sp>
+        <p:nvSpPr>
+          <p:cNvPr id="5" name="Subtitle 4"/>
+          <p:cNvSpPr>
+            <a:spLocks noGrp="1"/>
+          </p:cNvSpPr>
+          <p:nvPr>
+            <p:ph type="subTitle" idx="1"/>
+          </p:nvPr>
+        </p:nvSpPr>
+        <p:spPr>
+          <a:xfrm>
+            <a:off x="1417285" y="1574694"/>
+            <a:ext cx="6400800" cy="1752600"/>
+          </a:xfrm>
+        </p:spPr>
+        <p:txBody>
+          <a:bodyPr>
+            <a:normAutofit/>
+          </a:bodyPr>
+          <a:lstStyle/>
+          <a:p>
+            <a:r>
+              <a:rPr lang="en-US" sz="2400" dirty="0" smtClean="0"/>
+              <a:t>NOSQL is simply…</a:t>
+            </a:r>
+            <a:endParaRPr lang="en-US" sz="2400" dirty="0"/>
+          </a:p>
+        </p:txBody>
+      </p:sp>
+    </p:spTree>
+    <p:extLst>
+      <p:ext uri="{BB962C8B-B14F-4D97-AF65-F5344CB8AC3E}">
+        <p14:creationId xmlns:p14="http://schemas.microsoft.com/office/powerpoint/2010/main" val="2772107250"/>
+      </p:ext>
+    </p:extLst>
+  </p:cSld>
+  <p:clrMapOvr>
+    <a:masterClrMapping/>
+  </p:clrMapOvr>
+</p:sld>
+</file>
+
+<file path=ppt/slides/slide5.xml><?xml version="1.0" encoding="utf-8"?>
+<p:sld xmlns:a="http://schemas.openxmlformats.org/drawingml/2006/main" xmlns:r="http://schemas.openxmlformats.org/officeDocument/2006/relationships" xmlns:p="http://schemas.openxmlformats.org/presentationml/2006/main">
+  <p:cSld>
+    <p:spTree>
+      <p:nvGrpSpPr>
+        <p:cNvPr id="1" name=""/>
+        <p:cNvGrpSpPr/>
+        <p:nvPr/>
+      </p:nvGrpSpPr>
+      <p:grpSpPr>
+        <a:xfrm>
+          <a:off x="0" y="0"/>
+          <a:ext cx="0" cy="0"/>
+          <a:chOff x="0" y="0"/>
+          <a:chExt cx="0" cy="0"/>
+        </a:xfrm>
+      </p:grpSpPr>
+      <p:sp>
+        <p:nvSpPr>
+          <p:cNvPr id="4" name="Title 3"/>
+          <p:cNvSpPr>
+            <a:spLocks noGrp="1"/>
+          </p:cNvSpPr>
+          <p:nvPr>
+            <p:ph type="ctrTitle"/>
+          </p:nvPr>
+        </p:nvSpPr>
+        <p:spPr/>
+        <p:txBody>
+          <a:bodyPr/>
+          <a:lstStyle/>
+          <a:p>
+            <a:r>
+              <a:rPr lang="en-US" dirty="0" smtClean="0"/>
+              <a:t>Why NOSQL now?</a:t>
+            </a:r>
+            <a:endParaRPr lang="en-US" dirty="0"/>
+          </a:p>
+        </p:txBody>
+      </p:sp>
+      <p:sp>
+        <p:nvSpPr>
+          <p:cNvPr id="5" name="Subtitle 4"/>
+          <p:cNvSpPr>
+            <a:spLocks noGrp="1"/>
+          </p:cNvSpPr>
+          <p:nvPr>
+            <p:ph type="subTitle" idx="1"/>
+          </p:nvPr>
+        </p:nvSpPr>
+        <p:spPr/>
+        <p:txBody>
+          <a:bodyPr/>
+          <a:lstStyle/>
+          <a:p>
+            <a:r>
+              <a:rPr lang="en-US" dirty="0" smtClean="0"/>
+              <a:t>Four driving trends</a:t>
+            </a:r>
+            <a:endParaRPr lang="en-US" dirty="0"/>
+          </a:p>
+        </p:txBody>
+      </p:sp>
+    </p:spTree>
+    <p:extLst>
+      <p:ext uri="{BB962C8B-B14F-4D97-AF65-F5344CB8AC3E}">
+        <p14:creationId xmlns:p14="http://schemas.microsoft.com/office/powerpoint/2010/main" val="1316369355"/>
+      </p:ext>
+    </p:extLst>
+  </p:cSld>
+  <p:clrMapOvr>
+    <a:masterClrMapping/>
+  </p:clrMapOvr>
+</p:sld>
+</file>
+
+<file path=ppt/slides/slide6.xml><?xml version="1.0" encoding="utf-8"?>
+<p:sld xmlns:a="http://schemas.openxmlformats.org/drawingml/2006/main" xmlns:r="http://schemas.openxmlformats.org/officeDocument/2006/relationships" xmlns:p="http://schemas.openxmlformats.org/presentationml/2006/main">
+  <p:cSld>
+    <p:spTree>
+      <p:nvGrpSpPr>
+        <p:cNvPr id="1" name=""/>
+        <p:cNvGrpSpPr/>
+        <p:nvPr/>
+      </p:nvGrpSpPr>
+      <p:grpSpPr>
+        <a:xfrm>
+          <a:off x="0" y="0"/>
+          <a:ext cx="0" cy="0"/>
+          <a:chOff x="0" y="0"/>
+          <a:chExt cx="0" cy="0"/>
+        </a:xfrm>
+      </p:grpSpPr>
+      <p:sp>
+        <p:nvSpPr>
+          <p:cNvPr id="10" name="Title 9"/>
+          <p:cNvSpPr>
+            <a:spLocks noGrp="1"/>
+          </p:cNvSpPr>
+          <p:nvPr>
+            <p:ph type="title"/>
+          </p:nvPr>
+        </p:nvSpPr>
+        <p:spPr/>
+        <p:txBody>
+          <a:bodyPr/>
+          <a:lstStyle/>
+          <a:p>
+            <a:r>
+              <a:rPr lang="en-US" dirty="0" smtClean="0"/>
+              <a:t>Trend 1: Data Size</a:t>
+            </a:r>
+            <a:endParaRPr lang="en-US" dirty="0"/>
+          </a:p>
+        </p:txBody>
+      </p:sp>
+      <p:pic>
+        <p:nvPicPr>
+          <p:cNvPr id="15" name="Picture 14"/>
+          <p:cNvPicPr>
+            <a:picLocks noChangeAspect="1"/>
+          </p:cNvPicPr>
+          <p:nvPr/>
+        </p:nvPicPr>
+        <p:blipFill>
+          <a:blip r:embed="rId3"/>
+          <a:stretch>
+            <a:fillRect/>
+          </a:stretch>
+        </p:blipFill>
+        <p:spPr>
+          <a:xfrm>
+            <a:off x="218390" y="1557356"/>
+            <a:ext cx="8229600" cy="4533900"/>
+          </a:xfrm>
+          <a:prstGeom prst="rect">
+            <a:avLst/>
+          </a:prstGeom>
+        </p:spPr>
+      </p:pic>
+    </p:spTree>
+    <p:extLst>
+      <p:ext uri="{BB962C8B-B14F-4D97-AF65-F5344CB8AC3E}">
+        <p14:creationId xmlns:p14="http://schemas.microsoft.com/office/powerpoint/2010/main" val="78109167"/>
+      </p:ext>
+    </p:extLst>
+  </p:cSld>
+  <p:clrMapOvr>
+    <a:masterClrMapping/>
+  </p:clrMapOvr>
+  <p:timing>
+    <p:tnLst>
+      <p:par>
+        <p:cTn xmlns:p14="http://schemas.microsoft.com/office/powerpoint/2010/main" id="1" dur="indefinite" restart="never" nodeType="tmRoot"/>
+      </p:par>
+    </p:tnLst>
+  </p:timing>
+</p:sld>
+</file>
+
+<file path=ppt/slides/slide7.xml><?xml version="1.0" encoding="utf-8"?>
+<p:sld xmlns:a="http://schemas.openxmlformats.org/drawingml/2006/main" xmlns:r="http://schemas.openxmlformats.org/officeDocument/2006/relationships" xmlns:p="http://schemas.openxmlformats.org/presentationml/2006/main">
+  <p:cSld>
+    <p:spTree>
+      <p:nvGrpSpPr>
+        <p:cNvPr id="1" name=""/>
+        <p:cNvGrpSpPr/>
+        <p:nvPr/>
+      </p:nvGrpSpPr>
+      <p:grpSpPr>
+        <a:xfrm>
+          <a:off x="0" y="0"/>
+          <a:ext cx="0" cy="0"/>
+          <a:chOff x="0" y="0"/>
+          <a:chExt cx="0" cy="0"/>
+        </a:xfrm>
+      </p:grpSpPr>
+      <p:cxnSp>
+        <p:nvCxnSpPr>
+          <p:cNvPr id="24" name="Straight Arrow Connector 23"/>
+          <p:cNvCxnSpPr/>
+          <p:nvPr/>
+        </p:nvCxnSpPr>
+        <p:spPr>
+          <a:xfrm flipV="1">
+            <a:off x="793750" y="673046"/>
+            <a:ext cx="7130418" cy="5216579"/>
+          </a:xfrm>
+          <a:prstGeom prst="straightConnector1">
+            <a:avLst/>
+          </a:prstGeom>
+          <a:ln>
+            <a:tailEnd type="arrow"/>
+          </a:ln>
+        </p:spPr>
+        <p:style>
+          <a:lnRef idx="2">
+            <a:schemeClr val="accent1"/>
+          </a:lnRef>
+          <a:fillRef idx="0">
+            <a:schemeClr val="accent1"/>
+          </a:fillRef>
+          <a:effectRef idx="1">
+            <a:schemeClr val="accent1"/>
+          </a:effectRef>
+          <a:fontRef idx="minor">
+            <a:schemeClr val="tx1"/>
+          </a:fontRef>
+        </p:style>
+      </p:cxnSp>
+      <p:sp>
+        <p:nvSpPr>
+          <p:cNvPr id="2" name="Title 1"/>
+          <p:cNvSpPr>
+            <a:spLocks noGrp="1"/>
+          </p:cNvSpPr>
+          <p:nvPr>
+            <p:ph type="title"/>
+          </p:nvPr>
+        </p:nvSpPr>
+        <p:spPr/>
+        <p:txBody>
+          <a:bodyPr/>
+          <a:lstStyle/>
+          <a:p>
+            <a:r>
+              <a:rPr lang="en-US" dirty="0" smtClean="0"/>
+              <a:t>Trend 2: Connectedness</a:t>
+            </a:r>
+            <a:endParaRPr lang="en-US" dirty="0"/>
+          </a:p>
+        </p:txBody>
+      </p:sp>
+      <p:pic>
+        <p:nvPicPr>
+          <p:cNvPr id="6" name="Picture 5"/>
+          <p:cNvPicPr>
+            <a:picLocks noChangeAspect="1"/>
+          </p:cNvPicPr>
+          <p:nvPr/>
+        </p:nvPicPr>
+        <p:blipFill>
+          <a:blip r:embed="rId3"/>
+          <a:stretch>
+            <a:fillRect/>
+          </a:stretch>
+        </p:blipFill>
+        <p:spPr>
+          <a:xfrm>
+            <a:off x="751001" y="1613372"/>
+            <a:ext cx="6847516" cy="4315227"/>
+          </a:xfrm>
+          <a:prstGeom prst="rect">
+            <a:avLst/>
+          </a:prstGeom>
+        </p:spPr>
+      </p:pic>
+      <p:pic>
+        <p:nvPicPr>
+          <p:cNvPr id="7" name="Picture 6"/>
+          <p:cNvPicPr>
+            <a:picLocks noChangeAspect="1"/>
+          </p:cNvPicPr>
+          <p:nvPr/>
+        </p:nvPicPr>
+        <p:blipFill>
+          <a:blip r:embed="rId4"/>
+          <a:stretch>
+            <a:fillRect/>
+          </a:stretch>
+        </p:blipFill>
+        <p:spPr>
+          <a:xfrm>
+            <a:off x="1658848" y="5750504"/>
+            <a:ext cx="6265320" cy="659507"/>
+          </a:xfrm>
+          <a:prstGeom prst="rect">
+            <a:avLst/>
+          </a:prstGeom>
+        </p:spPr>
+      </p:pic>
+      <p:pic>
+        <p:nvPicPr>
+          <p:cNvPr id="8" name="Picture 7"/>
+          <p:cNvPicPr>
+            <a:picLocks noChangeAspect="1"/>
+          </p:cNvPicPr>
+          <p:nvPr/>
+        </p:nvPicPr>
+        <p:blipFill>
+          <a:blip r:embed="rId5"/>
+          <a:stretch>
+            <a:fillRect/>
+          </a:stretch>
+        </p:blipFill>
+        <p:spPr>
+          <a:xfrm>
+            <a:off x="2037232" y="5476123"/>
+            <a:ext cx="5387604" cy="452475"/>
+          </a:xfrm>
+          <a:prstGeom prst="rect">
+            <a:avLst/>
+          </a:prstGeom>
+        </p:spPr>
+      </p:pic>
+      <p:sp>
+        <p:nvSpPr>
+          <p:cNvPr id="9" name="TextBox 8"/>
+          <p:cNvSpPr txBox="1"/>
+          <p:nvPr/>
+        </p:nvSpPr>
+        <p:spPr>
+          <a:xfrm rot="16200000">
+            <a:off x="-692717" y="3484635"/>
+            <a:ext cx="2497499" cy="369332"/>
+          </a:xfrm>
+          <a:prstGeom prst="rect">
+            <a:avLst/>
+          </a:prstGeom>
+          <a:noFill/>
+        </p:spPr>
+        <p:txBody>
+          <a:bodyPr wrap="none" rtlCol="0">
+            <a:spAutoFit/>
+          </a:bodyPr>
+          <a:lstStyle/>
+          <a:p>
+            <a:r>
+              <a:rPr lang="en-US" dirty="0" smtClean="0"/>
+              <a:t>Information connectivity</a:t>
+            </a:r>
+            <a:endParaRPr lang="en-US" dirty="0"/>
+          </a:p>
+        </p:txBody>
+      </p:sp>
+      <p:sp>
+        <p:nvSpPr>
+          <p:cNvPr id="11" name="Rounded Rectangle 10"/>
+          <p:cNvSpPr/>
+          <p:nvPr/>
+        </p:nvSpPr>
+        <p:spPr>
+          <a:xfrm>
+            <a:off x="575317" y="5340936"/>
+            <a:ext cx="1280893" cy="488500"/>
+          </a:xfrm>
+          <a:prstGeom prst="roundRect">
+            <a:avLst>
+              <a:gd name="adj" fmla="val 6590"/>
+            </a:avLst>
+          </a:prstGeom>
+        </p:spPr>
+        <p:style>
+          <a:lnRef idx="1">
+            <a:schemeClr val="dk1"/>
+          </a:lnRef>
+          <a:fillRef idx="2">
+            <a:schemeClr val="dk1"/>
+          </a:fillRef>
+          <a:effectRef idx="1">
+            <a:schemeClr val="dk1"/>
+          </a:effectRef>
+          <a:fontRef idx="minor">
+            <a:schemeClr val="dk1"/>
+          </a:fontRef>
+        </p:style>
+        <p:txBody>
+          <a:bodyPr rtlCol="0" anchor="ctr"/>
+          <a:lstStyle/>
+          <a:p>
+            <a:pPr algn="ctr"/>
+            <a:r>
+              <a:rPr lang="en-US" sz="1400" dirty="0" smtClean="0"/>
+              <a:t>Text Documents</a:t>
+            </a:r>
+            <a:endParaRPr lang="en-US" sz="1400" dirty="0"/>
+          </a:p>
+        </p:txBody>
+      </p:sp>
+      <p:sp>
+        <p:nvSpPr>
+          <p:cNvPr id="12" name="Rounded Rectangle 11"/>
+          <p:cNvSpPr/>
+          <p:nvPr/>
+        </p:nvSpPr>
+        <p:spPr>
+          <a:xfrm>
+            <a:off x="1899631" y="5069546"/>
+            <a:ext cx="1280893" cy="271390"/>
+          </a:xfrm>
+          <a:prstGeom prst="roundRect">
+            <a:avLst>
+              <a:gd name="adj" fmla="val 6590"/>
+            </a:avLst>
+          </a:prstGeom>
+        </p:spPr>
+        <p:style>
+          <a:lnRef idx="1">
+            <a:schemeClr val="dk1"/>
+          </a:lnRef>
+          <a:fillRef idx="2">
+            <a:schemeClr val="dk1"/>
+          </a:fillRef>
+          <a:effectRef idx="1">
+            <a:schemeClr val="dk1"/>
+          </a:effectRef>
+          <a:fontRef idx="minor">
+            <a:schemeClr val="dk1"/>
+          </a:fontRef>
+        </p:style>
+        <p:txBody>
+          <a:bodyPr rtlCol="0" anchor="ctr"/>
+          <a:lstStyle/>
+          <a:p>
+            <a:pPr algn="ctr"/>
+            <a:r>
+              <a:rPr lang="en-US" sz="1400" dirty="0" smtClean="0"/>
+              <a:t>Hypertext</a:t>
+            </a:r>
+            <a:endParaRPr lang="en-US" sz="1400" dirty="0"/>
+          </a:p>
+        </p:txBody>
+      </p:sp>
+      <p:sp>
+        <p:nvSpPr>
+          <p:cNvPr id="13" name="Rounded Rectangle 12"/>
+          <p:cNvSpPr/>
+          <p:nvPr/>
+        </p:nvSpPr>
+        <p:spPr>
+          <a:xfrm>
+            <a:off x="2942143" y="4456630"/>
+            <a:ext cx="1280893" cy="271390"/>
+          </a:xfrm>
+          <a:prstGeom prst="roundRect">
+            <a:avLst>
+              <a:gd name="adj" fmla="val 6590"/>
+            </a:avLst>
+          </a:prstGeom>
+        </p:spPr>
+        <p:style>
+          <a:lnRef idx="1">
+            <a:schemeClr val="dk1"/>
+          </a:lnRef>
+          <a:fillRef idx="2">
+            <a:schemeClr val="dk1"/>
+          </a:fillRef>
+          <a:effectRef idx="1">
+            <a:schemeClr val="dk1"/>
+          </a:effectRef>
+          <a:fontRef idx="minor">
+            <a:schemeClr val="dk1"/>
+          </a:fontRef>
+        </p:style>
+        <p:txBody>
+          <a:bodyPr rtlCol="0" anchor="ctr"/>
+          <a:lstStyle/>
+          <a:p>
+            <a:pPr algn="ctr"/>
+            <a:r>
+              <a:rPr lang="en-US" sz="1400" dirty="0" smtClean="0"/>
+              <a:t>Feeds</a:t>
+            </a:r>
+            <a:endParaRPr lang="en-US" sz="1400" dirty="0"/>
+          </a:p>
+        </p:txBody>
+      </p:sp>
+      <p:sp>
+        <p:nvSpPr>
+          <p:cNvPr id="14" name="Rounded Rectangle 13"/>
+          <p:cNvSpPr/>
+          <p:nvPr/>
+        </p:nvSpPr>
+        <p:spPr>
+          <a:xfrm>
+            <a:off x="3180524" y="4060824"/>
+            <a:ext cx="1280893" cy="271390"/>
+          </a:xfrm>
+          <a:prstGeom prst="roundRect">
+            <a:avLst>
+              <a:gd name="adj" fmla="val 6590"/>
+            </a:avLst>
+          </a:prstGeom>
+        </p:spPr>
+        <p:style>
+          <a:lnRef idx="1">
+            <a:schemeClr val="dk1"/>
+          </a:lnRef>
+          <a:fillRef idx="2">
+            <a:schemeClr val="dk1"/>
+          </a:fillRef>
+          <a:effectRef idx="1">
+            <a:schemeClr val="dk1"/>
+          </a:effectRef>
+          <a:fontRef idx="minor">
+            <a:schemeClr val="dk1"/>
+          </a:fontRef>
+        </p:style>
+        <p:txBody>
+          <a:bodyPr rtlCol="0" anchor="ctr"/>
+          <a:lstStyle/>
+          <a:p>
+            <a:pPr algn="ctr"/>
+            <a:r>
+              <a:rPr lang="en-US" sz="1400" dirty="0" smtClean="0"/>
+              <a:t>Blogs</a:t>
+            </a:r>
+            <a:endParaRPr lang="en-US" sz="1400" dirty="0"/>
+          </a:p>
+        </p:txBody>
+      </p:sp>
+      <p:sp>
+        <p:nvSpPr>
+          <p:cNvPr id="16" name="Rounded Rectangle 15"/>
+          <p:cNvSpPr/>
+          <p:nvPr/>
+        </p:nvSpPr>
+        <p:spPr>
+          <a:xfrm>
+            <a:off x="3072403" y="3193225"/>
+            <a:ext cx="1280893" cy="271390"/>
+          </a:xfrm>
+          <a:prstGeom prst="roundRect">
+            <a:avLst>
+              <a:gd name="adj" fmla="val 6590"/>
+            </a:avLst>
+          </a:prstGeom>
+        </p:spPr>
+        <p:style>
+          <a:lnRef idx="1">
+            <a:schemeClr val="dk1"/>
+          </a:lnRef>
+          <a:fillRef idx="2">
+            <a:schemeClr val="dk1"/>
+          </a:fillRef>
+          <a:effectRef idx="1">
+            <a:schemeClr val="dk1"/>
+          </a:effectRef>
+          <a:fontRef idx="minor">
+            <a:schemeClr val="dk1"/>
+          </a:fontRef>
+        </p:style>
+        <p:txBody>
+          <a:bodyPr rtlCol="0" anchor="ctr"/>
+          <a:lstStyle/>
+          <a:p>
+            <a:pPr algn="ctr"/>
+            <a:r>
+              <a:rPr lang="en-US" sz="1400" dirty="0" smtClean="0"/>
+              <a:t>Wikis</a:t>
+            </a:r>
+            <a:endParaRPr lang="en-US" sz="1400" dirty="0"/>
+          </a:p>
+        </p:txBody>
+      </p:sp>
+      <p:sp>
+        <p:nvSpPr>
+          <p:cNvPr id="17" name="Rounded Rectangle 16"/>
+          <p:cNvSpPr/>
+          <p:nvPr/>
+        </p:nvSpPr>
+        <p:spPr>
+          <a:xfrm>
+            <a:off x="3712849" y="3682573"/>
+            <a:ext cx="1280893" cy="271390"/>
+          </a:xfrm>
+          <a:prstGeom prst="roundRect">
+            <a:avLst>
+              <a:gd name="adj" fmla="val 6590"/>
+            </a:avLst>
+          </a:prstGeom>
+        </p:spPr>
+        <p:style>
+          <a:lnRef idx="1">
+            <a:schemeClr val="dk1"/>
+          </a:lnRef>
+          <a:fillRef idx="2">
+            <a:schemeClr val="dk1"/>
+          </a:fillRef>
+          <a:effectRef idx="1">
+            <a:schemeClr val="dk1"/>
+          </a:effectRef>
+          <a:fontRef idx="minor">
+            <a:schemeClr val="dk1"/>
+          </a:fontRef>
+        </p:style>
+        <p:txBody>
+          <a:bodyPr rtlCol="0" anchor="ctr"/>
+          <a:lstStyle/>
+          <a:p>
+            <a:pPr algn="ctr"/>
+            <a:r>
+              <a:rPr lang="en-US" sz="1400" dirty="0" smtClean="0"/>
+              <a:t>UGC</a:t>
+            </a:r>
+            <a:endParaRPr lang="en-US" sz="1400" dirty="0"/>
+          </a:p>
+        </p:txBody>
+      </p:sp>
+      <p:sp>
+        <p:nvSpPr>
+          <p:cNvPr id="18" name="Rounded Rectangle 17"/>
+          <p:cNvSpPr/>
+          <p:nvPr/>
+        </p:nvSpPr>
+        <p:spPr>
+          <a:xfrm>
+            <a:off x="3820970" y="2748569"/>
+            <a:ext cx="1280893" cy="271390"/>
+          </a:xfrm>
+          <a:prstGeom prst="roundRect">
+            <a:avLst>
+              <a:gd name="adj" fmla="val 6590"/>
+            </a:avLst>
+          </a:prstGeom>
+        </p:spPr>
+        <p:style>
+          <a:lnRef idx="1">
+            <a:schemeClr val="dk1"/>
+          </a:lnRef>
+          <a:fillRef idx="2">
+            <a:schemeClr val="dk1"/>
+          </a:fillRef>
+          <a:effectRef idx="1">
+            <a:schemeClr val="dk1"/>
+          </a:effectRef>
+          <a:fontRef idx="minor">
+            <a:schemeClr val="dk1"/>
+          </a:fontRef>
+        </p:style>
+        <p:txBody>
+          <a:bodyPr rtlCol="0" anchor="ctr"/>
+          <a:lstStyle/>
+          <a:p>
+            <a:pPr algn="ctr"/>
+            <a:r>
+              <a:rPr lang="en-US" sz="1400" dirty="0" smtClean="0"/>
+              <a:t>Tagging</a:t>
+            </a:r>
+            <a:endParaRPr lang="en-US" sz="1400" dirty="0"/>
+          </a:p>
+        </p:txBody>
+      </p:sp>
+      <p:sp>
+        <p:nvSpPr>
+          <p:cNvPr id="19" name="Rounded Rectangle 18"/>
+          <p:cNvSpPr/>
+          <p:nvPr/>
+        </p:nvSpPr>
+        <p:spPr>
+          <a:xfrm>
+            <a:off x="5134859" y="2477179"/>
+            <a:ext cx="1280893" cy="271390"/>
+          </a:xfrm>
+          <a:prstGeom prst="roundRect">
+            <a:avLst>
+              <a:gd name="adj" fmla="val 6590"/>
+            </a:avLst>
+          </a:prstGeom>
+        </p:spPr>
+        <p:style>
+          <a:lnRef idx="1">
+            <a:schemeClr val="dk1"/>
+          </a:lnRef>
+          <a:fillRef idx="2">
+            <a:schemeClr val="dk1"/>
+          </a:fillRef>
+          <a:effectRef idx="1">
+            <a:schemeClr val="dk1"/>
+          </a:effectRef>
+          <a:fontRef idx="minor">
+            <a:schemeClr val="dk1"/>
+          </a:fontRef>
+        </p:style>
+        <p:txBody>
+          <a:bodyPr rtlCol="0" anchor="ctr"/>
+          <a:lstStyle/>
+          <a:p>
+            <a:pPr algn="ctr"/>
+            <a:r>
+              <a:rPr lang="en-US" sz="1400" dirty="0" smtClean="0"/>
+              <a:t>Folksonomies</a:t>
+            </a:r>
+            <a:endParaRPr lang="en-US" sz="1400" dirty="0"/>
+          </a:p>
+        </p:txBody>
+      </p:sp>
+      <p:sp>
+        <p:nvSpPr>
+          <p:cNvPr id="20" name="Rounded Rectangle 19"/>
+          <p:cNvSpPr/>
+          <p:nvPr/>
+        </p:nvSpPr>
+        <p:spPr>
+          <a:xfrm>
+            <a:off x="5254264" y="1885973"/>
+            <a:ext cx="1280893" cy="271390"/>
+          </a:xfrm>
+          <a:prstGeom prst="roundRect">
+            <a:avLst>
+              <a:gd name="adj" fmla="val 6590"/>
+            </a:avLst>
+          </a:prstGeom>
+        </p:spPr>
+        <p:style>
+          <a:lnRef idx="1">
+            <a:schemeClr val="dk1"/>
+          </a:lnRef>
+          <a:fillRef idx="2">
+            <a:schemeClr val="dk1"/>
+          </a:fillRef>
+          <a:effectRef idx="1">
+            <a:schemeClr val="dk1"/>
+          </a:effectRef>
+          <a:fontRef idx="minor">
+            <a:schemeClr val="dk1"/>
+          </a:fontRef>
+        </p:style>
+        <p:txBody>
+          <a:bodyPr rtlCol="0" anchor="ctr"/>
+          <a:lstStyle/>
+          <a:p>
+            <a:pPr algn="ctr"/>
+            <a:r>
+              <a:rPr lang="en-US" sz="1400" dirty="0" err="1" smtClean="0"/>
+              <a:t>RDFa</a:t>
+            </a:r>
+            <a:endParaRPr lang="en-US" sz="1400" dirty="0"/>
+          </a:p>
+        </p:txBody>
+      </p:sp>
+      <p:sp>
+        <p:nvSpPr>
+          <p:cNvPr id="21" name="Rounded Rectangle 20"/>
+          <p:cNvSpPr/>
+          <p:nvPr/>
+        </p:nvSpPr>
+        <p:spPr>
+          <a:xfrm>
+            <a:off x="5775305" y="1477677"/>
+            <a:ext cx="1280893" cy="271390"/>
+          </a:xfrm>
+          <a:prstGeom prst="roundRect">
+            <a:avLst>
+              <a:gd name="adj" fmla="val 6590"/>
+            </a:avLst>
+          </a:prstGeom>
+        </p:spPr>
+        <p:style>
+          <a:lnRef idx="1">
+            <a:schemeClr val="dk1"/>
+          </a:lnRef>
+          <a:fillRef idx="2">
+            <a:schemeClr val="dk1"/>
+          </a:fillRef>
+          <a:effectRef idx="1">
+            <a:schemeClr val="dk1"/>
+          </a:effectRef>
+          <a:fontRef idx="minor">
+            <a:schemeClr val="dk1"/>
+          </a:fontRef>
+        </p:style>
+        <p:txBody>
+          <a:bodyPr rtlCol="0" anchor="ctr"/>
+          <a:lstStyle/>
+          <a:p>
+            <a:pPr algn="ctr"/>
+            <a:r>
+              <a:rPr lang="en-US" sz="1400" dirty="0" err="1" smtClean="0"/>
+              <a:t>Onotologies</a:t>
+            </a:r>
+            <a:endParaRPr lang="en-US" sz="1400" dirty="0"/>
+          </a:p>
+        </p:txBody>
+      </p:sp>
+      <p:sp>
+        <p:nvSpPr>
+          <p:cNvPr id="22" name="Rounded Rectangle 21"/>
+          <p:cNvSpPr/>
+          <p:nvPr/>
+        </p:nvSpPr>
+        <p:spPr>
+          <a:xfrm>
+            <a:off x="6296346" y="1134517"/>
+            <a:ext cx="1280893" cy="271390"/>
+          </a:xfrm>
+          <a:prstGeom prst="roundRect">
+            <a:avLst>
+              <a:gd name="adj" fmla="val 6590"/>
+            </a:avLst>
+          </a:prstGeom>
+        </p:spPr>
+        <p:style>
+          <a:lnRef idx="1">
+            <a:schemeClr val="dk1"/>
+          </a:lnRef>
+          <a:fillRef idx="2">
+            <a:schemeClr val="dk1"/>
+          </a:fillRef>
+          <a:effectRef idx="1">
+            <a:schemeClr val="dk1"/>
+          </a:effectRef>
+          <a:fontRef idx="minor">
+            <a:schemeClr val="dk1"/>
+          </a:fontRef>
+        </p:style>
+        <p:txBody>
+          <a:bodyPr rtlCol="0" anchor="ctr"/>
+          <a:lstStyle/>
+          <a:p>
+            <a:pPr algn="ctr"/>
+            <a:r>
+              <a:rPr lang="en-US" sz="1400" dirty="0" smtClean="0"/>
+              <a:t>GGG</a:t>
+            </a:r>
+            <a:endParaRPr lang="en-US" sz="1400" dirty="0"/>
+          </a:p>
+        </p:txBody>
+      </p:sp>
+    </p:spTree>
+    <p:extLst>
+      <p:ext uri="{BB962C8B-B14F-4D97-AF65-F5344CB8AC3E}">
+        <p14:creationId xmlns:p14="http://schemas.microsoft.com/office/powerpoint/2010/main" val="3130446730"/>
+      </p:ext>
+    </p:extLst>
+  </p:cSld>
+  <p:clrMapOvr>
+    <a:masterClrMapping/>
+  </p:clrMapOvr>
+  <p:timing>
+    <p:tnLst>
+      <p:par>
+        <p:cTn xmlns:p14="http://schemas.microsoft.com/office/powerpoint/2010/main" id="1" dur="indefinite" restart="never" nodeType="tmRoot">
+          <p:childTnLst>
+            <p:seq concurrent="1" nextAc="seek">
+              <p:cTn id="2" dur="indefinite" nodeType="mainSeq">
+                <p:childTnLst>
+                  <p:par>
+                    <p:cTn id="3" fill="hold">
+                      <p:stCondLst>
+                        <p:cond delay="indefinite"/>
+                      </p:stCondLst>
+                      <p:childTnLst>
+                        <p:par>
+                          <p:cTn id="4" fill="hold">
+                            <p:stCondLst>
+                              <p:cond delay="0"/>
+                            </p:stCondLst>
+                            <p:childTnLst>
+                              <p:par>
+                                <p:cTn id="5" presetID="1" presetClass="entr" presetSubtype="0" fill="hold" grpId="0" nodeType="clickEffect">
+                                  <p:stCondLst>
+                                    <p:cond delay="0"/>
+                                  </p:stCondLst>
+                                  <p:childTnLst>
+                                    <p:set>
+                                      <p:cBhvr>
+                                        <p:cTn id="6" dur="1" fill="hold">
+                                          <p:stCondLst>
+                                            <p:cond delay="0"/>
+                                          </p:stCondLst>
+                                        </p:cTn>
+                                        <p:tgtEl>
+                                          <p:spTgt spid="11"/>
+                                        </p:tgtEl>
+                                        <p:attrNameLst>
+                                          <p:attrName>style.visibility</p:attrName>
+                                        </p:attrNameLst>
+                                      </p:cBhvr>
+                                      <p:to>
+                                        <p:strVal val="visible"/>
+                                      </p:to>
+                                    </p:set>
+                                  </p:childTnLst>
+                                </p:cTn>
+                              </p:par>
+                            </p:childTnLst>
+                          </p:cTn>
+                        </p:par>
+                      </p:childTnLst>
+                    </p:cTn>
+                  </p:par>
+                  <p:par>
+                    <p:cTn id="7" fill="hold">
+                      <p:stCondLst>
+                        <p:cond delay="indefinite"/>
+                      </p:stCondLst>
+                      <p:childTnLst>
+                        <p:par>
+                          <p:cTn id="8" fill="hold">
+                            <p:stCondLst>
+                              <p:cond delay="0"/>
+                            </p:stCondLst>
+                            <p:childTnLst>
+                              <p:par>
+                                <p:cTn id="9" presetID="1" presetClass="entr" presetSubtype="0" fill="hold" grpId="0" nodeType="clickEffect">
+                                  <p:stCondLst>
+                                    <p:cond delay="0"/>
+                                  </p:stCondLst>
+                                  <p:childTnLst>
+                                    <p:set>
+                                      <p:cBhvr>
+                                        <p:cTn id="10" dur="1" fill="hold">
+                                          <p:stCondLst>
+                                            <p:cond delay="0"/>
+                                          </p:stCondLst>
+                                        </p:cTn>
+                                        <p:tgtEl>
+                                          <p:spTgt spid="12"/>
+                                        </p:tgtEl>
+                                        <p:attrNameLst>
+                                          <p:attrName>style.visibility</p:attrName>
+                                        </p:attrNameLst>
+                                      </p:cBhvr>
+                                      <p:to>
+                                        <p:strVal val="visible"/>
+                                      </p:to>
+                                    </p:set>
+                                  </p:childTnLst>
+                                </p:cTn>
+                              </p:par>
+                            </p:childTnLst>
+                          </p:cTn>
+                        </p:par>
+                      </p:childTnLst>
+                    </p:cTn>
+                  </p:par>
+                  <p:par>
+                    <p:cTn id="11" fill="hold">
+                      <p:stCondLst>
+                        <p:cond delay="indefinite"/>
+                      </p:stCondLst>
+                      <p:childTnLst>
+                        <p:par>
+                          <p:cTn id="12" fill="hold">
+                            <p:stCondLst>
+                              <p:cond delay="0"/>
+                            </p:stCondLst>
+                            <p:childTnLst>
+                              <p:par>
+                                <p:cTn id="13" presetID="1" presetClass="entr" presetSubtype="0" fill="hold" grpId="0" nodeType="clickEffect">
+                                  <p:stCondLst>
+                                    <p:cond delay="0"/>
+                                  </p:stCondLst>
+                                  <p:childTnLst>
+                                    <p:set>
+                                      <p:cBhvr>
+                                        <p:cTn id="14" dur="1" fill="hold">
+                                          <p:stCondLst>
+                                            <p:cond delay="0"/>
+                                          </p:stCondLst>
+                                        </p:cTn>
+                                        <p:tgtEl>
+                                          <p:spTgt spid="13"/>
+                                        </p:tgtEl>
+                                        <p:attrNameLst>
+                                          <p:attrName>style.visibility</p:attrName>
+                                        </p:attrNameLst>
+                                      </p:cBhvr>
+                                      <p:to>
+                                        <p:strVal val="visible"/>
+                                      </p:to>
+                                    </p:set>
+                                  </p:childTnLst>
+                                </p:cTn>
+                              </p:par>
+                              <p:par>
+                                <p:cTn id="15" presetID="1" presetClass="entr" presetSubtype="0" fill="hold" grpId="0" nodeType="withEffect">
+                                  <p:stCondLst>
+                                    <p:cond delay="0"/>
+                                  </p:stCondLst>
+                                  <p:childTnLst>
+                                    <p:set>
+                                      <p:cBhvr>
+                                        <p:cTn id="16" dur="1" fill="hold">
+                                          <p:stCondLst>
+                                            <p:cond delay="0"/>
+                                          </p:stCondLst>
+                                        </p:cTn>
+                                        <p:tgtEl>
+                                          <p:spTgt spid="14"/>
+                                        </p:tgtEl>
+                                        <p:attrNameLst>
+                                          <p:attrName>style.visibility</p:attrName>
+                                        </p:attrNameLst>
+                                      </p:cBhvr>
+                                      <p:to>
+                                        <p:strVal val="visible"/>
+                                      </p:to>
+                                    </p:set>
+                                  </p:childTnLst>
+                                </p:cTn>
+                              </p:par>
+                              <p:par>
+                                <p:cTn id="17" presetID="1" presetClass="entr" presetSubtype="0" fill="hold" grpId="0" nodeType="withEffect">
+                                  <p:stCondLst>
+                                    <p:cond delay="0"/>
+                                  </p:stCondLst>
+                                  <p:childTnLst>
+                                    <p:set>
+                                      <p:cBhvr>
+                                        <p:cTn id="18" dur="1" fill="hold">
+                                          <p:stCondLst>
+                                            <p:cond delay="0"/>
+                                          </p:stCondLst>
+                                        </p:cTn>
+                                        <p:tgtEl>
+                                          <p:spTgt spid="17"/>
+                                        </p:tgtEl>
+                                        <p:attrNameLst>
+                                          <p:attrName>style.visibility</p:attrName>
+                                        </p:attrNameLst>
+                                      </p:cBhvr>
+                                      <p:to>
+                                        <p:strVal val="visible"/>
+                                      </p:to>
+                                    </p:set>
+                                  </p:childTnLst>
+                                </p:cTn>
+                              </p:par>
+                              <p:par>
+                                <p:cTn id="19" presetID="1" presetClass="entr" presetSubtype="0" fill="hold" grpId="0" nodeType="withEffect">
+                                  <p:stCondLst>
+                                    <p:cond delay="0"/>
+                                  </p:stCondLst>
+                                  <p:childTnLst>
+                                    <p:set>
+                                      <p:cBhvr>
+                                        <p:cTn id="20" dur="1" fill="hold">
+                                          <p:stCondLst>
+                                            <p:cond delay="0"/>
+                                          </p:stCondLst>
+                                        </p:cTn>
+                                        <p:tgtEl>
+                                          <p:spTgt spid="16"/>
+                                        </p:tgtEl>
+                                        <p:attrNameLst>
+                                          <p:attrName>style.visibility</p:attrName>
+                                        </p:attrNameLst>
+                                      </p:cBhvr>
+                                      <p:to>
+                                        <p:strVal val="visible"/>
+                                      </p:to>
+                                    </p:set>
+                                  </p:childTnLst>
+                                </p:cTn>
+                              </p:par>
+                            </p:childTnLst>
+                          </p:cTn>
+                        </p:par>
+                      </p:childTnLst>
+                    </p:cTn>
+                  </p:par>
+                  <p:par>
+                    <p:cTn id="21" fill="hold">
+                      <p:stCondLst>
+                        <p:cond delay="indefinite"/>
+                      </p:stCondLst>
+                      <p:childTnLst>
+                        <p:par>
+                          <p:cTn id="22" fill="hold">
+                            <p:stCondLst>
+                              <p:cond delay="0"/>
+                            </p:stCondLst>
+                            <p:childTnLst>
+                              <p:par>
+                                <p:cTn id="23" presetID="1" presetClass="entr" presetSubtype="0" fill="hold" grpId="0" nodeType="clickEffect">
+                                  <p:stCondLst>
+                                    <p:cond delay="0"/>
+                                  </p:stCondLst>
+                                  <p:childTnLst>
+                                    <p:set>
+                                      <p:cBhvr>
+                                        <p:cTn id="24" dur="1" fill="hold">
+                                          <p:stCondLst>
+                                            <p:cond delay="0"/>
+                                          </p:stCondLst>
+                                        </p:cTn>
+                                        <p:tgtEl>
+                                          <p:spTgt spid="18"/>
+                                        </p:tgtEl>
+                                        <p:attrNameLst>
+                                          <p:attrName>style.visibility</p:attrName>
+                                        </p:attrNameLst>
+                                      </p:cBhvr>
+                                      <p:to>
+                                        <p:strVal val="visible"/>
+                                      </p:to>
+                                    </p:set>
+                                  </p:childTnLst>
+                                </p:cTn>
+                              </p:par>
+                            </p:childTnLst>
+                          </p:cTn>
+                        </p:par>
+                      </p:childTnLst>
+                    </p:cTn>
+                  </p:par>
+                  <p:par>
+                    <p:cTn id="25" fill="hold">
+                      <p:stCondLst>
+                        <p:cond delay="indefinite"/>
+                      </p:stCondLst>
+                      <p:childTnLst>
+                        <p:par>
+                          <p:cTn id="26" fill="hold">
+                            <p:stCondLst>
+                              <p:cond delay="0"/>
+                            </p:stCondLst>
+                            <p:childTnLst>
+                              <p:par>
+                                <p:cTn id="27" presetID="1" presetClass="entr" presetSubtype="0" fill="hold" grpId="0" nodeType="clickEffect">
+                                  <p:stCondLst>
+                                    <p:cond delay="0"/>
+                                  </p:stCondLst>
+                                  <p:childTnLst>
+                                    <p:set>
+                                      <p:cBhvr>
+                                        <p:cTn id="28" dur="1" fill="hold">
+                                          <p:stCondLst>
+                                            <p:cond delay="0"/>
+                                          </p:stCondLst>
+                                        </p:cTn>
+                                        <p:tgtEl>
+                                          <p:spTgt spid="19"/>
+                                        </p:tgtEl>
+                                        <p:attrNameLst>
+                                          <p:attrName>style.visibility</p:attrName>
+                                        </p:attrNameLst>
+                                      </p:cBhvr>
+                                      <p:to>
+                                        <p:strVal val="visible"/>
+                                      </p:to>
+                                    </p:set>
+                                  </p:childTnLst>
+                                </p:cTn>
+                              </p:par>
+                            </p:childTnLst>
+                          </p:cTn>
+                        </p:par>
+                      </p:childTnLst>
+                    </p:cTn>
+                  </p:par>
+                  <p:par>
+                    <p:cTn id="29" fill="hold">
+                      <p:stCondLst>
+                        <p:cond delay="indefinite"/>
+                      </p:stCondLst>
+                      <p:childTnLst>
+                        <p:par>
+                          <p:cTn id="30" fill="hold">
+                            <p:stCondLst>
+                              <p:cond delay="0"/>
+                            </p:stCondLst>
+                            <p:childTnLst>
+                              <p:par>
+                                <p:cTn id="31" presetID="1" presetClass="entr" presetSubtype="0" fill="hold" grpId="0" nodeType="clickEffect">
+                                  <p:stCondLst>
+                                    <p:cond delay="0"/>
+                                  </p:stCondLst>
+                                  <p:childTnLst>
+                                    <p:set>
+                                      <p:cBhvr>
+                                        <p:cTn id="32" dur="1" fill="hold">
+                                          <p:stCondLst>
+                                            <p:cond delay="0"/>
+                                          </p:stCondLst>
+                                        </p:cTn>
+                                        <p:tgtEl>
+                                          <p:spTgt spid="20"/>
+                                        </p:tgtEl>
+                                        <p:attrNameLst>
+                                          <p:attrName>style.visibility</p:attrName>
+                                        </p:attrNameLst>
+                                      </p:cBhvr>
+                                      <p:to>
+                                        <p:strVal val="visible"/>
+                                      </p:to>
+                                    </p:set>
+                                  </p:childTnLst>
+                                </p:cTn>
+                              </p:par>
+                            </p:childTnLst>
+                          </p:cTn>
+                        </p:par>
+                      </p:childTnLst>
+                    </p:cTn>
+                  </p:par>
+                  <p:par>
+                    <p:cTn id="33" fill="hold">
+                      <p:stCondLst>
+                        <p:cond delay="indefinite"/>
+                      </p:stCondLst>
+                      <p:childTnLst>
+                        <p:par>
+                          <p:cTn id="34" fill="hold">
+                            <p:stCondLst>
+                              <p:cond delay="0"/>
+                            </p:stCondLst>
+                            <p:childTnLst>
+                              <p:par>
+                                <p:cTn id="35" presetID="1" presetClass="entr" presetSubtype="0" fill="hold" grpId="0" nodeType="clickEffect">
+                                  <p:stCondLst>
+                                    <p:cond delay="0"/>
+                                  </p:stCondLst>
+                                  <p:childTnLst>
+                                    <p:set>
+                                      <p:cBhvr>
+                                        <p:cTn id="36" dur="1" fill="hold">
+                                          <p:stCondLst>
+                                            <p:cond delay="0"/>
+                                          </p:stCondLst>
+                                        </p:cTn>
+                                        <p:tgtEl>
+                                          <p:spTgt spid="21"/>
+                                        </p:tgtEl>
+                                        <p:attrNameLst>
+                                          <p:attrName>style.visibility</p:attrName>
+                                        </p:attrNameLst>
+                                      </p:cBhvr>
+                                      <p:to>
+                                        <p:strVal val="visible"/>
+                                      </p:to>
+                                    </p:set>
+                                  </p:childTnLst>
+                                </p:cTn>
+                              </p:par>
+                            </p:childTnLst>
+                          </p:cTn>
+                        </p:par>
+                      </p:childTnLst>
+                    </p:cTn>
+                  </p:par>
+                  <p:par>
+                    <p:cTn id="37" fill="hold">
+                      <p:stCondLst>
+                        <p:cond delay="indefinite"/>
+                      </p:stCondLst>
+                      <p:childTnLst>
+                        <p:par>
+                          <p:cTn id="38" fill="hold">
+                            <p:stCondLst>
+                              <p:cond delay="0"/>
+                            </p:stCondLst>
+                            <p:childTnLst>
+                              <p:par>
+                                <p:cTn id="39" presetID="1" presetClass="entr" presetSubtype="0" fill="hold" grpId="0" nodeType="clickEffect">
+                                  <p:stCondLst>
+                                    <p:cond delay="0"/>
+                                  </p:stCondLst>
+                                  <p:childTnLst>
+                                    <p:set>
+                                      <p:cBhvr>
+                                        <p:cTn id="40" dur="1" fill="hold">
+                                          <p:stCondLst>
+                                            <p:cond delay="0"/>
+                                          </p:stCondLst>
+                                        </p:cTn>
+                                        <p:tgtEl>
+                                          <p:spTgt spid="22"/>
+                                        </p:tgtEl>
+                                        <p:attrNameLst>
+                                          <p:attrName>style.visibility</p:attrName>
+                                        </p:attrNameLst>
+                                      </p:cBhvr>
+                                      <p:to>
+                                        <p:strVal val="visible"/>
+                                      </p:to>
+                                    </p:set>
+                                  </p:childTnLst>
+                                </p:cTn>
+                              </p:par>
+                            </p:childTnLst>
+                          </p:cTn>
+                        </p:par>
+                      </p:childTnLst>
+                    </p:cTn>
+                  </p:par>
+                  <p:par>
+                    <p:cTn id="41" fill="hold">
+                      <p:stCondLst>
+                        <p:cond delay="indefinite"/>
+                      </p:stCondLst>
+                      <p:childTnLst>
+                        <p:par>
+                          <p:cTn id="42" fill="hold">
+                            <p:stCondLst>
+                              <p:cond delay="0"/>
+                            </p:stCondLst>
+                            <p:childTnLst>
+                              <p:par>
+                                <p:cTn id="43" presetID="22" presetClass="entr" presetSubtype="4" fill="hold" nodeType="clickEffect">
+                                  <p:stCondLst>
+                                    <p:cond delay="0"/>
+                                  </p:stCondLst>
+                                  <p:childTnLst>
+                                    <p:set>
+                                      <p:cBhvr>
+                                        <p:cTn id="44" dur="1" fill="hold">
+                                          <p:stCondLst>
+                                            <p:cond delay="0"/>
+                                          </p:stCondLst>
+                                        </p:cTn>
+                                        <p:tgtEl>
+                                          <p:spTgt spid="24"/>
+                                        </p:tgtEl>
+                                        <p:attrNameLst>
+                                          <p:attrName>style.visibility</p:attrName>
+                                        </p:attrNameLst>
+                                      </p:cBhvr>
+                                      <p:to>
+                                        <p:strVal val="visible"/>
+                                      </p:to>
+                                    </p:set>
+                                    <p:animEffect transition="in" filter="wipe(down)">
+                                      <p:cBhvr>
+                                        <p:cTn id="45" dur="500"/>
+                                        <p:tgtEl>
+                                          <p:spTgt spid="24"/>
+                                        </p:tgtEl>
+                                      </p:cBhvr>
+                                    </p:animEffect>
+                                  </p:childTnLst>
+                                </p:cTn>
+                              </p:par>
+                            </p:childTnLst>
+                          </p:cTn>
+                        </p:par>
+                      </p:childTnLst>
+                    </p:cTn>
+                  </p:par>
+                </p:childTnLst>
+              </p:cTn>
+              <p:prevCondLst>
+                <p:cond evt="onPrev" delay="0">
+                  <p:tgtEl>
+                    <p:sldTgt/>
+                  </p:tgtEl>
+                </p:cond>
+              </p:prevCondLst>
+              <p:nextCondLst>
+                <p:cond evt="onNext" delay="0">
+                  <p:tgtEl>
+                    <p:sldTgt/>
+                  </p:tgtEl>
+                </p:cond>
+              </p:nextCondLst>
+            </p:seq>
+          </p:childTnLst>
+        </p:cTn>
+      </p:par>
+    </p:tnLst>
+    <p:bldLst>
+      <p:bldP spid="11" grpId="0" animBg="1"/>
+      <p:bldP spid="12" grpId="0" animBg="1"/>
+      <p:bldP spid="13" grpId="0" animBg="1"/>
+      <p:bldP spid="14" grpId="0" animBg="1"/>
+      <p:bldP spid="16" grpId="0" animBg="1"/>
+      <p:bldP spid="17" grpId="0" animBg="1"/>
+      <p:bldP spid="18" grpId="0" animBg="1"/>
+      <p:bldP spid="19" grpId="0" animBg="1"/>
+      <p:bldP spid="20" grpId="0" animBg="1"/>
+      <p:bldP spid="21" grpId="0" animBg="1"/>
+      <p:bldP spid="22" grpId="0" animBg="1"/>
+    </p:bldLst>
+  </p:timing>
+</p:sld>
+</file>
+
+<file path=ppt/slides/slide8.xml><?xml version="1.0" encoding="utf-8"?>
+<p:sld xmlns:a="http://schemas.openxmlformats.org/drawingml/2006/main" xmlns:r="http://schemas.openxmlformats.org/officeDocument/2006/relationships" xmlns:p="http://schemas.openxmlformats.org/presentationml/2006/main">
+  <p:cSld>
+    <p:spTree>
+      <p:nvGrpSpPr>
+        <p:cNvPr id="1" name=""/>
+        <p:cNvGrpSpPr/>
+        <p:nvPr/>
+      </p:nvGrpSpPr>
+      <p:grpSpPr>
+        <a:xfrm>
+          <a:off x="0" y="0"/>
+          <a:ext cx="0" cy="0"/>
+          <a:chOff x="0" y="0"/>
+          <a:chExt cx="0" cy="0"/>
+        </a:xfrm>
+      </p:grpSpPr>
+      <p:sp>
+        <p:nvSpPr>
+          <p:cNvPr id="2" name="Title 1"/>
+          <p:cNvSpPr>
+            <a:spLocks noGrp="1"/>
+          </p:cNvSpPr>
+          <p:nvPr>
+            <p:ph type="title"/>
+          </p:nvPr>
+        </p:nvSpPr>
+        <p:spPr/>
+        <p:txBody>
+          <a:bodyPr>
+            <a:normAutofit fontScale="90000"/>
+          </a:bodyPr>
+          <a:lstStyle/>
+          <a:p>
+            <a:r>
+              <a:rPr lang="en-US" dirty="0" smtClean="0"/>
+              <a:t>Trend 3: Semi-structured information</a:t>
+            </a:r>
+            <a:endParaRPr lang="en-US" dirty="0"/>
+          </a:p>
+        </p:txBody>
+      </p:sp>
+      <p:sp>
+        <p:nvSpPr>
+          <p:cNvPr id="3" name="Content Placeholder 2"/>
+          <p:cNvSpPr>
+            <a:spLocks noGrp="1"/>
+          </p:cNvSpPr>
+          <p:nvPr>
+            <p:ph idx="1"/>
+          </p:nvPr>
+        </p:nvSpPr>
+        <p:spPr/>
+        <p:txBody>
+          <a:bodyPr>
+            <a:normAutofit/>
+          </a:bodyPr>
+          <a:lstStyle/>
+          <a:p>
+            <a:r>
+              <a:rPr lang="en-US" dirty="0" err="1" smtClean="0"/>
+              <a:t>Individualisation</a:t>
+            </a:r>
+            <a:r>
+              <a:rPr lang="en-US" dirty="0" smtClean="0"/>
+              <a:t> </a:t>
+            </a:r>
+            <a:r>
+              <a:rPr lang="en-US" dirty="0"/>
+              <a:t>of content</a:t>
+            </a:r>
+          </a:p>
+          <a:p>
+            <a:pPr lvl="1"/>
+            <a:r>
+              <a:rPr lang="en-US" dirty="0" smtClean="0"/>
+              <a:t>1970’s salary lists, all </a:t>
+            </a:r>
+            <a:r>
+              <a:rPr lang="en-US" dirty="0"/>
+              <a:t>elements </a:t>
+            </a:r>
+            <a:r>
+              <a:rPr lang="en-US" dirty="0" smtClean="0"/>
+              <a:t>exactly </a:t>
+            </a:r>
+            <a:r>
+              <a:rPr lang="en-US" dirty="0"/>
+              <a:t>one job</a:t>
+            </a:r>
+          </a:p>
+          <a:p>
+            <a:pPr lvl="1"/>
+            <a:r>
+              <a:rPr lang="en-US" dirty="0" smtClean="0"/>
+              <a:t>2000’s salary lists, </a:t>
+            </a:r>
+            <a:r>
+              <a:rPr lang="en-US" dirty="0"/>
+              <a:t>we need </a:t>
+            </a:r>
+            <a:r>
+              <a:rPr lang="en-US" dirty="0" smtClean="0"/>
+              <a:t>many </a:t>
+            </a:r>
+            <a:r>
+              <a:rPr lang="en-US" dirty="0"/>
+              <a:t>job columns! </a:t>
+            </a:r>
+          </a:p>
+          <a:p>
+            <a:r>
+              <a:rPr lang="en-US" dirty="0"/>
+              <a:t>All encompassing “entire world views”</a:t>
+            </a:r>
+          </a:p>
+          <a:p>
+            <a:r>
+              <a:rPr lang="en-US" dirty="0"/>
+              <a:t>Store more data about each entity</a:t>
+            </a:r>
+          </a:p>
+          <a:p>
+            <a:r>
+              <a:rPr lang="en-US" dirty="0"/>
+              <a:t>Trend accelerated by the decentralization of content generation </a:t>
+            </a:r>
+            <a:endParaRPr lang="en-US" dirty="0" smtClean="0"/>
+          </a:p>
+          <a:p>
+            <a:pPr lvl="1"/>
+            <a:r>
+              <a:rPr lang="en-US" dirty="0" smtClean="0"/>
+              <a:t>Age </a:t>
+            </a:r>
+            <a:r>
+              <a:rPr lang="en-US" dirty="0"/>
+              <a:t>of participation (“web 2.0”)</a:t>
+            </a:r>
+            <a:endParaRPr lang="en-US" dirty="0"/>
+          </a:p>
+        </p:txBody>
+      </p:sp>
+    </p:spTree>
+    <p:extLst>
+      <p:ext uri="{BB962C8B-B14F-4D97-AF65-F5344CB8AC3E}">
+        <p14:creationId xmlns:p14="http://schemas.microsoft.com/office/powerpoint/2010/main" val="234734660"/>
+      </p:ext>
+    </p:extLst>
+  </p:cSld>
+  <p:clrMapOvr>
+    <a:masterClrMapping/>
+  </p:clrMapOvr>
+  <p:timing>
+    <p:tnLst>
+      <p:par>
+        <p:cTn xmlns:p14="http://schemas.microsoft.com/office/powerpoint/2010/main" id="1" dur="indefinite" restart="never" nodeType="tmRoot"/>
+      </p:par>
+    </p:tnLst>
+  </p:timing>
+</p:sld>
+</file>
+
+<file path=ppt/slides/slide9.xml><?xml version="1.0" encoding="utf-8"?>
+<p:sld xmlns:a="http://schemas.openxmlformats.org/drawingml/2006/main" xmlns:r="http://schemas.openxmlformats.org/officeDocument/2006/relationships" xmlns:p="http://schemas.openxmlformats.org/presentationml/2006/main">
+  <p:cSld>
+    <p:spTree>
+      <p:nvGrpSpPr>
+        <p:cNvPr id="1" name=""/>
+        <p:cNvGrpSpPr/>
+        <p:nvPr/>
+      </p:nvGrpSpPr>
+      <p:grpSpPr>
+        <a:xfrm>
+          <a:off x="0" y="0"/>
+          <a:ext cx="0" cy="0"/>
+          <a:chOff x="0" y="0"/>
+          <a:chExt cx="0" cy="0"/>
+        </a:xfrm>
+      </p:grpSpPr>
+      <p:sp>
+        <p:nvSpPr>
+          <p:cNvPr id="4" name="Title 3"/>
+          <p:cNvSpPr>
+            <a:spLocks noGrp="1"/>
+          </p:cNvSpPr>
+          <p:nvPr>
+            <p:ph type="title"/>
+          </p:nvPr>
+        </p:nvSpPr>
+        <p:spPr/>
+        <p:txBody>
+          <a:bodyPr/>
+          <a:lstStyle/>
+          <a:p>
+            <a:r>
+              <a:rPr lang="en-US" dirty="0" smtClean="0"/>
+              <a:t>Side note: RDBMS performance</a:t>
+            </a:r>
+            <a:endParaRPr lang="en-US" dirty="0"/>
+          </a:p>
+        </p:txBody>
+      </p:sp>
+      <p:pic>
+        <p:nvPicPr>
+          <p:cNvPr id="8" name="Picture 7"/>
+          <p:cNvPicPr>
+            <a:picLocks noChangeAspect="1"/>
+          </p:cNvPicPr>
+          <p:nvPr/>
+        </p:nvPicPr>
+        <p:blipFill>
+          <a:blip r:embed="rId3"/>
+          <a:stretch>
+            <a:fillRect/>
+          </a:stretch>
+        </p:blipFill>
+        <p:spPr>
+          <a:xfrm>
+            <a:off x="103899" y="1417638"/>
+            <a:ext cx="7585364" cy="4927396"/>
+          </a:xfrm>
+          <a:prstGeom prst="rect">
+            <a:avLst/>
+          </a:prstGeom>
+        </p:spPr>
+      </p:pic>
+    </p:spTree>
+    <p:extLst>
+      <p:ext uri="{BB962C8B-B14F-4D97-AF65-F5344CB8AC3E}">
+        <p14:creationId xmlns:p14="http://schemas.microsoft.com/office/powerpoint/2010/main" val="342264589"/>
+      </p:ext>
+    </p:extLst>
+  </p:cSld>
+  <p:clrMapOvr>
+    <a:masterClrMapping/>
+  </p:clrMapOvr>
+  <p:timing>
+    <p:tnLst>
+      <p:par>
+        <p:cTn xmlns:p14="http://schemas.microsoft.com/office/powerpoint/2010/main" id="1" dur="indefinite" restart="never" nodeType="tmRoot"/>
+      </p:par>
+    </p:tnLst>
+  </p:timing>
 </p:sld>
 </file>
 
@@ -2744,4 +5648,324 @@
   </a:objectDefaults>
   <a:extraClrSchemeLst/>
 </a:theme>
+</file>
+
+<file path=ppt/theme/theme2.xml><?xml version="1.0" encoding="utf-8"?>
+<a:theme xmlns:a="http://schemas.openxmlformats.org/drawingml/2006/main" name="Office Theme">
+  <a:themeElements>
+    <a:clrScheme name="Office">
+      <a:dk1>
+        <a:sysClr val="windowText" lastClr="000000"/>
+      </a:dk1>
+      <a:lt1>
+        <a:sysClr val="window" lastClr="FFFFFF"/>
+      </a:lt1>
+      <a:dk2>
+        <a:srgbClr val="1F497D"/>
+      </a:dk2>
+      <a:lt2>
+        <a:srgbClr val="EEECE1"/>
+      </a:lt2>
+      <a:accent1>
+        <a:srgbClr val="4F81BD"/>
+      </a:accent1>
+      <a:accent2>
+        <a:srgbClr val="C0504D"/>
+      </a:accent2>
+      <a:accent3>
+        <a:srgbClr val="9BBB59"/>
+      </a:accent3>
+      <a:accent4>
+        <a:srgbClr val="8064A2"/>
+      </a:accent4>
+      <a:accent5>
+        <a:srgbClr val="4BACC6"/>
+      </a:accent5>
+      <a:accent6>
+        <a:srgbClr val="F79646"/>
+      </a:accent6>
+      <a:hlink>
+        <a:srgbClr val="0000FF"/>
+      </a:hlink>
+      <a:folHlink>
+        <a:srgbClr val="800080"/>
+      </a:folHlink>
+    </a:clrScheme>
+    <a:fontScheme name="Office">
+      <a:majorFont>
+        <a:latin typeface="Calibri"/>
+        <a:ea typeface=""/>
+        <a:cs typeface=""/>
+        <a:font script="Jpan" typeface="ＭＳ Ｐゴシック"/>
+        <a:font script="Hang" typeface="맑은 고딕"/>
+        <a:font script="Hans" typeface="宋体"/>
+        <a:font script="Hant" typeface="新細明體"/>
+        <a:font script="Arab" typeface="Times New Roman"/>
+        <a:font script="Hebr" typeface="Times New Roman"/>
+        <a:font script="Thai" typeface="Angsana New"/>
+        <a:font script="Ethi" typeface="Nyala"/>
+        <a:font script="Beng" typeface="Vrinda"/>
+        <a:font script="Gujr" typeface="Shruti"/>
+        <a:font script="Khmr" typeface="MoolBoran"/>
+        <a:font script="Knda" typeface="Tunga"/>
+        <a:font script="Guru" typeface="Raavi"/>
+        <a:font script="Cans" typeface="Euphemia"/>
+        <a:font script="Cher" typeface="Plantagenet Cherokee"/>
+        <a:font script="Yiii" typeface="Microsoft Yi Baiti"/>
+        <a:font script="Tibt" typeface="Microsoft Himalaya"/>
+        <a:font script="Thaa" typeface="MV Boli"/>
+        <a:font script="Deva" typeface="Mangal"/>
+        <a:font script="Telu" typeface="Gautami"/>
+        <a:font script="Taml" typeface="Latha"/>
+        <a:font script="Syrc" typeface="Estrangelo Edessa"/>
+        <a:font script="Orya" typeface="Kalinga"/>
+        <a:font script="Mlym" typeface="Kartika"/>
+        <a:font script="Laoo" typeface="DokChampa"/>
+        <a:font script="Sinh" typeface="Iskoola Pota"/>
+        <a:font script="Mong" typeface="Mongolian Baiti"/>
+        <a:font script="Viet" typeface="Times New Roman"/>
+        <a:font script="Uigh" typeface="Microsoft Uighur"/>
+        <a:font script="Geor" typeface="Sylfaen"/>
+      </a:majorFont>
+      <a:minorFont>
+        <a:latin typeface="Calibri"/>
+        <a:ea typeface=""/>
+        <a:cs typeface=""/>
+        <a:font script="Jpan" typeface="ＭＳ Ｐゴシック"/>
+        <a:font script="Hang" typeface="맑은 고딕"/>
+        <a:font script="Hans" typeface="宋体"/>
+        <a:font script="Hant" typeface="新細明體"/>
+        <a:font script="Arab" typeface="Arial"/>
+        <a:font script="Hebr" typeface="Arial"/>
+        <a:font script="Thai" typeface="Cordia New"/>
+        <a:font script="Ethi" typeface="Nyala"/>
+        <a:font script="Beng" typeface="Vrinda"/>
+        <a:font script="Gujr" typeface="Shruti"/>
+        <a:font script="Khmr" typeface="DaunPenh"/>
+        <a:font script="Knda" typeface="Tunga"/>
+        <a:font script="Guru" typeface="Raavi"/>
+        <a:font script="Cans" typeface="Euphemia"/>
+        <a:font script="Cher" typeface="Plantagenet Cherokee"/>
+        <a:font script="Yiii" typeface="Microsoft Yi Baiti"/>
+        <a:font script="Tibt" typeface="Microsoft Himalaya"/>
+        <a:font script="Thaa" typeface="MV Boli"/>
+        <a:font script="Deva" typeface="Mangal"/>
+        <a:font script="Telu" typeface="Gautami"/>
+        <a:font script="Taml" typeface="Latha"/>
+        <a:font script="Syrc" typeface="Estrangelo Edessa"/>
+        <a:font script="Orya" typeface="Kalinga"/>
+        <a:font script="Mlym" typeface="Kartika"/>
+        <a:font script="Laoo" typeface="DokChampa"/>
+        <a:font script="Sinh" typeface="Iskoola Pota"/>
+        <a:font script="Mong" typeface="Mongolian Baiti"/>
+        <a:font script="Viet" typeface="Arial"/>
+        <a:font script="Uigh" typeface="Microsoft Uighur"/>
+        <a:font script="Geor" typeface="Sylfaen"/>
+      </a:minorFont>
+    </a:fontScheme>
+    <a:fmtScheme name="Office">
+      <a:fillStyleLst>
+        <a:solidFill>
+          <a:schemeClr val="phClr"/>
+        </a:solidFill>
+        <a:gradFill rotWithShape="1">
+          <a:gsLst>
+            <a:gs pos="0">
+              <a:schemeClr val="phClr">
+                <a:tint val="50000"/>
+                <a:satMod val="300000"/>
+              </a:schemeClr>
+            </a:gs>
+            <a:gs pos="35000">
+              <a:schemeClr val="phClr">
+                <a:tint val="37000"/>
+                <a:satMod val="300000"/>
+              </a:schemeClr>
+            </a:gs>
+            <a:gs pos="100000">
+              <a:schemeClr val="phClr">
+                <a:tint val="15000"/>
+                <a:satMod val="350000"/>
+              </a:schemeClr>
+            </a:gs>
+          </a:gsLst>
+          <a:lin ang="16200000" scaled="1"/>
+        </a:gradFill>
+        <a:gradFill rotWithShape="1">
+          <a:gsLst>
+            <a:gs pos="0">
+              <a:schemeClr val="phClr">
+                <a:tint val="100000"/>
+                <a:shade val="100000"/>
+                <a:satMod val="130000"/>
+              </a:schemeClr>
+            </a:gs>
+            <a:gs pos="100000">
+              <a:schemeClr val="phClr">
+                <a:tint val="50000"/>
+                <a:shade val="100000"/>
+                <a:satMod val="350000"/>
+              </a:schemeClr>
+            </a:gs>
+          </a:gsLst>
+          <a:lin ang="16200000" scaled="0"/>
+        </a:gradFill>
+      </a:fillStyleLst>
+      <a:lnStyleLst>
+        <a:ln w="9525" cap="flat" cmpd="sng" algn="ctr">
+          <a:solidFill>
+            <a:schemeClr val="phClr">
+              <a:shade val="95000"/>
+              <a:satMod val="105000"/>
+            </a:schemeClr>
+          </a:solidFill>
+          <a:prstDash val="solid"/>
+        </a:ln>
+        <a:ln w="25400" cap="flat" cmpd="sng" algn="ctr">
+          <a:solidFill>
+            <a:schemeClr val="phClr"/>
+          </a:solidFill>
+          <a:prstDash val="solid"/>
+        </a:ln>
+        <a:ln w="38100" cap="flat" cmpd="sng" algn="ctr">
+          <a:solidFill>
+            <a:schemeClr val="phClr"/>
+          </a:solidFill>
+          <a:prstDash val="solid"/>
+        </a:ln>
+      </a:lnStyleLst>
+      <a:effectStyleLst>
+        <a:effectStyle>
+          <a:effectLst>
+            <a:outerShdw blurRad="40000" dist="20000" dir="5400000" rotWithShape="0">
+              <a:srgbClr val="000000">
+                <a:alpha val="38000"/>
+              </a:srgbClr>
+            </a:outerShdw>
+          </a:effectLst>
+        </a:effectStyle>
+        <a:effectStyle>
+          <a:effectLst>
+            <a:outerShdw blurRad="40000" dist="23000" dir="5400000" rotWithShape="0">
+              <a:srgbClr val="000000">
+                <a:alpha val="35000"/>
+              </a:srgbClr>
+            </a:outerShdw>
+          </a:effectLst>
+        </a:effectStyle>
+        <a:effectStyle>
+          <a:effectLst>
+            <a:outerShdw blurRad="40000" dist="23000" dir="5400000" rotWithShape="0">
+              <a:srgbClr val="000000">
+                <a:alpha val="35000"/>
+              </a:srgbClr>
+            </a:outerShdw>
+          </a:effectLst>
+          <a:scene3d>
+            <a:camera prst="orthographicFront">
+              <a:rot lat="0" lon="0" rev="0"/>
+            </a:camera>
+            <a:lightRig rig="threePt" dir="t">
+              <a:rot lat="0" lon="0" rev="1200000"/>
+            </a:lightRig>
+          </a:scene3d>
+          <a:sp3d>
+            <a:bevelT w="63500" h="25400"/>
+          </a:sp3d>
+        </a:effectStyle>
+      </a:effectStyleLst>
+      <a:bgFillStyleLst>
+        <a:solidFill>
+          <a:schemeClr val="phClr"/>
+        </a:solidFill>
+        <a:gradFill rotWithShape="1">
+          <a:gsLst>
+            <a:gs pos="0">
+              <a:schemeClr val="phClr">
+                <a:tint val="40000"/>
+                <a:satMod val="350000"/>
+              </a:schemeClr>
+            </a:gs>
+            <a:gs pos="40000">
+              <a:schemeClr val="phClr">
+                <a:tint val="45000"/>
+                <a:shade val="99000"/>
+                <a:satMod val="350000"/>
+              </a:schemeClr>
+            </a:gs>
+            <a:gs pos="100000">
+              <a:schemeClr val="phClr">
+                <a:shade val="20000"/>
+                <a:satMod val="255000"/>
+              </a:schemeClr>
+            </a:gs>
+          </a:gsLst>
+          <a:path path="circle">
+            <a:fillToRect l="50000" t="-80000" r="50000" b="180000"/>
+          </a:path>
+        </a:gradFill>
+        <a:gradFill rotWithShape="1">
+          <a:gsLst>
+            <a:gs pos="0">
+              <a:schemeClr val="phClr">
+                <a:tint val="80000"/>
+                <a:satMod val="300000"/>
+              </a:schemeClr>
+            </a:gs>
+            <a:gs pos="100000">
+              <a:schemeClr val="phClr">
+                <a:shade val="30000"/>
+                <a:satMod val="200000"/>
+              </a:schemeClr>
+            </a:gs>
+          </a:gsLst>
+          <a:path path="circle">
+            <a:fillToRect l="50000" t="50000" r="50000" b="50000"/>
+          </a:path>
+        </a:gradFill>
+      </a:bgFillStyleLst>
+    </a:fmtScheme>
+  </a:themeElements>
+  <a:objectDefaults>
+    <a:spDef>
+      <a:spPr/>
+      <a:bodyPr/>
+      <a:lstStyle/>
+      <a:style>
+        <a:lnRef idx="1">
+          <a:schemeClr val="accent1"/>
+        </a:lnRef>
+        <a:fillRef idx="3">
+          <a:schemeClr val="accent1"/>
+        </a:fillRef>
+        <a:effectRef idx="2">
+          <a:schemeClr val="accent1"/>
+        </a:effectRef>
+        <a:fontRef idx="minor">
+          <a:schemeClr val="lt1"/>
+        </a:fontRef>
+      </a:style>
+    </a:spDef>
+    <a:lnDef>
+      <a:spPr/>
+      <a:bodyPr/>
+      <a:lstStyle/>
+      <a:style>
+        <a:lnRef idx="2">
+          <a:schemeClr val="accent1"/>
+        </a:lnRef>
+        <a:fillRef idx="0">
+          <a:schemeClr val="accent1"/>
+        </a:fillRef>
+        <a:effectRef idx="1">
+          <a:schemeClr val="accent1"/>
+        </a:effectRef>
+        <a:fontRef idx="minor">
+          <a:schemeClr val="tx1"/>
+        </a:fontRef>
+      </a:style>
+    </a:lnDef>
+  </a:objectDefaults>
+  <a:extraClrSchemeLst/>
+</a:theme>
 </file>
</xml_diff>